<commit_message>
a little change to the slides
</commit_message>
<xml_diff>
--- a/presentations/Qual_2012_YuHuang.pptx
+++ b/presentations/Qual_2012_YuHuang.pptx
@@ -268,7 +268,7 @@
           <a:p>
             <a:fld id="{89111220-B39A-49CE-9112-9B116A3B1043}" type="datetimeFigureOut">
               <a:rPr lang="en-US" smtClean="0"/>
-              <a:t>9/13/12</a:t>
+              <a:t>9/13/2012</a:t>
             </a:fld>
             <a:endParaRPr lang="en-US"/>
           </a:p>
@@ -433,7 +433,7 @@
           <a:p>
             <a:fld id="{B6FF9642-E0FC-4E41-87C5-4272C67560A0}" type="datetimeFigureOut">
               <a:rPr lang="en-US" smtClean="0"/>
-              <a:t>9/13/12</a:t>
+              <a:t>9/13/2012</a:t>
             </a:fld>
             <a:endParaRPr lang="en-US"/>
           </a:p>
@@ -952,11 +952,7 @@
           <a:p>
             <a:r>
               <a:rPr lang="en-US" dirty="0" smtClean="0"/>
-              <a:t>This </a:t>
-            </a:r>
-            <a:r>
-              <a:rPr lang="en-US" dirty="0" smtClean="0"/>
-              <a:t>slide</a:t>
+              <a:t>This slide</a:t>
             </a:r>
             <a:r>
               <a:rPr lang="en-US" baseline="0" dirty="0" smtClean="0"/>
@@ -1137,11 +1133,7 @@
           <a:p>
             <a:r>
               <a:rPr lang="en-US" dirty="0" smtClean="0"/>
-              <a:t>This </a:t>
-            </a:r>
-            <a:r>
-              <a:rPr lang="en-US" dirty="0" smtClean="0"/>
-              <a:t>slide</a:t>
+              <a:t>This slide</a:t>
             </a:r>
             <a:r>
               <a:rPr lang="en-US" baseline="0" dirty="0" smtClean="0"/>
@@ -1322,11 +1314,7 @@
           <a:p>
             <a:r>
               <a:rPr lang="en-US" dirty="0" smtClean="0"/>
-              <a:t>This </a:t>
-            </a:r>
-            <a:r>
-              <a:rPr lang="en-US" dirty="0" smtClean="0"/>
-              <a:t>slide</a:t>
+              <a:t>This slide</a:t>
             </a:r>
             <a:r>
               <a:rPr lang="en-US" baseline="0" dirty="0" smtClean="0"/>
@@ -1507,11 +1495,7 @@
           <a:p>
             <a:r>
               <a:rPr lang="en-US" dirty="0" smtClean="0"/>
-              <a:t>This </a:t>
-            </a:r>
-            <a:r>
-              <a:rPr lang="en-US" dirty="0" smtClean="0"/>
-              <a:t>slide</a:t>
+              <a:t>This slide</a:t>
             </a:r>
             <a:r>
               <a:rPr lang="en-US" baseline="0" dirty="0" smtClean="0"/>
@@ -2035,11 +2019,7 @@
             </a:r>
             <a:r>
               <a:rPr lang="en-US" baseline="0" dirty="0" smtClean="0"/>
-              <a:t> </a:t>
-            </a:r>
-            <a:r>
-              <a:rPr lang="en-US" baseline="0" dirty="0" smtClean="0"/>
-              <a:t>slice illustrates two execution traces of our running example.</a:t>
+              <a:t> slice illustrates two execution traces of our running example.</a:t>
             </a:r>
           </a:p>
           <a:p>
@@ -2330,11 +2310,7 @@
             </a:r>
             <a:r>
               <a:rPr lang="en-US" baseline="0" dirty="0" smtClean="0"/>
-              <a:t> </a:t>
-            </a:r>
-            <a:r>
-              <a:rPr lang="en-US" baseline="0" dirty="0" smtClean="0"/>
-              <a:t>one-task program execution given above is allowed by MCAPI specification.</a:t>
+              <a:t> one-task program execution given above is allowed by MCAPI specification.</a:t>
             </a:r>
           </a:p>
           <a:p>
@@ -2392,15 +2368,7 @@
           <a:p>
             <a:r>
               <a:rPr lang="en-US" baseline="0" dirty="0" smtClean="0"/>
-              <a:t>Other than functions for message passing, we have other structures, like if statement and assert, for the program control flow and property </a:t>
-            </a:r>
-            <a:r>
-              <a:rPr lang="en-US" baseline="0" dirty="0" smtClean="0"/>
-              <a:t>checking</a:t>
-            </a:r>
-            <a:r>
-              <a:rPr lang="en-US" baseline="0" dirty="0" smtClean="0"/>
-              <a:t>.</a:t>
+              <a:t>Other than functions for message passing, we have other structures, like if statement and assert, for the program control flow and property checking.</a:t>
             </a:r>
             <a:endParaRPr lang="en-US" dirty="0"/>
           </a:p>
@@ -2862,11 +2830,7 @@
           <a:p>
             <a:r>
               <a:rPr lang="en-US" altLang="zh-CN" dirty="0" smtClean="0"/>
-              <a:t>As </a:t>
-            </a:r>
-            <a:r>
-              <a:rPr lang="en-US" altLang="zh-CN" dirty="0" smtClean="0"/>
-              <a:t>proof sketch</a:t>
+              <a:t>As proof sketch</a:t>
             </a:r>
             <a:r>
               <a:rPr lang="en-US" altLang="zh-CN" baseline="0" dirty="0" smtClean="0"/>
@@ -2988,11 +2952,7 @@
             </a:r>
             <a:r>
               <a:rPr lang="en-US" altLang="zh-CN" baseline="0" dirty="0" smtClean="0"/>
-              <a:t> </a:t>
-            </a:r>
-            <a:r>
-              <a:rPr lang="en-US" altLang="zh-CN" baseline="0" dirty="0" smtClean="0"/>
-              <a:t>1 and 2 proves that an over-approximated match set can also capture the correct non-deterministic behaviors of a program execution. Now we give an algorithm that generates such an over-approximation with quadratic time complexity. </a:t>
+              <a:t> 1 and 2 proves that an over-approximated match set can also capture the correct non-deterministic behaviors of a program execution. Now we give an algorithm that generates such an over-approximation with quadratic time complexity. </a:t>
             </a:r>
           </a:p>
           <a:p>
@@ -3259,11 +3219,7 @@
             </a:r>
             <a:r>
               <a:rPr lang="en-US" altLang="zh-CN" baseline="0" dirty="0" smtClean="0"/>
-              <a:t> </a:t>
-            </a:r>
-            <a:r>
-              <a:rPr lang="en-US" altLang="zh-CN" baseline="0" dirty="0" smtClean="0"/>
-              <a:t>major step of our algorithm is to apply three rules to all possible match pairs. </a:t>
+              <a:t> major step of our algorithm is to apply three rules to all possible match pairs. </a:t>
             </a:r>
           </a:p>
           <a:p>
@@ -3791,11 +3747,7 @@
             </a:r>
             <a:r>
               <a:rPr lang="en-US" baseline="0" dirty="0" smtClean="0"/>
-              <a:t> </a:t>
-            </a:r>
-            <a:r>
-              <a:rPr lang="en-US" baseline="0" dirty="0" smtClean="0"/>
-              <a:t>by a regular MCAPI operation, we give a shorthand representation that is enough to present the program execution.</a:t>
+              <a:t> by a regular MCAPI operation, we give a shorthand representation that is enough to present the program execution.</a:t>
             </a:r>
           </a:p>
           <a:p>
@@ -3927,11 +3879,7 @@
           <a:p>
             <a:r>
               <a:rPr lang="en-US" baseline="0" dirty="0" smtClean="0"/>
-              <a:t>Here </a:t>
-            </a:r>
-            <a:r>
-              <a:rPr lang="en-US" baseline="0" dirty="0" smtClean="0"/>
-              <a:t>is an MCAPI program represented by shorthand operations.</a:t>
+              <a:t>Here is an MCAPI program represented by shorthand operations.</a:t>
             </a:r>
           </a:p>
           <a:p>
@@ -4386,27 +4334,13 @@
               <a:p>
                 <a:r>
                   <a:rPr lang="en-US" dirty="0" smtClean="0"/>
-                  <a:t>A </a:t>
-                </a:r>
-                <a:r>
-                  <a:rPr lang="en-US" dirty="0" smtClean="0"/>
-                  <a:t>correct and efficient SMT encoding of an MCAPI program execution that detects all program errors if the user provided match pairs are precise or over-approximated.</a:t>
+                  <a:t>A correct and efficient SMT encoding of an MCAPI program execution that detects all program errors if the user provided match pairs are precise or over-approximated.</a:t>
                 </a:r>
               </a:p>
               <a:p>
                 <a:r>
                   <a:rPr lang="en-US" dirty="0" smtClean="0"/>
-                  <a:t>An </a:t>
-                </a:r>
-                <a14:m/>
-                <a:r>
-                  <a:rPr lang="en-US" dirty="0" smtClean="0"/>
-                  <a:t> algorithm to generate an over-approximation of possible match pairs, where </a:t>
-                </a:r>
-                <a14:m/>
-                <a:r>
-                  <a:rPr lang="en-US" dirty="0" smtClean="0"/>
-                  <a:t> is the size of the execution trace at lines of code.</a:t>
+                  <a:t>An  algorithm to generate an over-approximation of possible match pairs, where  is the size of the execution trace at lines of code.</a:t>
                 </a:r>
               </a:p>
               <a:p>
@@ -5081,7 +5015,7 @@
           <a:p>
             <a:fld id="{F84A4CBD-960A-456A-9B79-9A5DAA6E02E9}" type="datetime1">
               <a:rPr lang="en-US" smtClean="0"/>
-              <a:t>9/13/12</a:t>
+              <a:t>9/13/2012</a:t>
             </a:fld>
             <a:endParaRPr lang="en-US"/>
           </a:p>
@@ -5247,7 +5181,7 @@
           <a:p>
             <a:fld id="{6FFB0080-53E0-4E29-9C87-13FA032C8670}" type="datetime1">
               <a:rPr lang="en-US" smtClean="0"/>
-              <a:t>9/13/12</a:t>
+              <a:t>9/13/2012</a:t>
             </a:fld>
             <a:endParaRPr lang="en-US"/>
           </a:p>
@@ -5423,7 +5357,7 @@
           <a:p>
             <a:fld id="{4C97581C-C694-4A06-BF33-FF47280C11E9}" type="datetime1">
               <a:rPr lang="en-US" smtClean="0"/>
-              <a:t>9/13/12</a:t>
+              <a:t>9/13/2012</a:t>
             </a:fld>
             <a:endParaRPr lang="en-US"/>
           </a:p>
@@ -5589,7 +5523,7 @@
           <a:p>
             <a:fld id="{75320065-1C4F-4F35-ADCD-61DA485BD8F4}" type="datetime1">
               <a:rPr lang="en-US" smtClean="0"/>
-              <a:t>9/13/12</a:t>
+              <a:t>9/13/2012</a:t>
             </a:fld>
             <a:endParaRPr lang="en-US"/>
           </a:p>
@@ -5831,7 +5765,7 @@
           <a:p>
             <a:fld id="{3DE56400-8624-4CE8-A431-7BAD40CC2038}" type="datetime1">
               <a:rPr lang="en-US" smtClean="0"/>
-              <a:t>9/13/12</a:t>
+              <a:t>9/13/2012</a:t>
             </a:fld>
             <a:endParaRPr lang="en-US"/>
           </a:p>
@@ -6115,7 +6049,7 @@
           <a:p>
             <a:fld id="{2D095419-4A23-4EC7-827A-7FC7404DDFBC}" type="datetime1">
               <a:rPr lang="en-US" smtClean="0"/>
-              <a:t>9/13/12</a:t>
+              <a:t>9/13/2012</a:t>
             </a:fld>
             <a:endParaRPr lang="en-US"/>
           </a:p>
@@ -6533,7 +6467,7 @@
           <a:p>
             <a:fld id="{702B5342-B9F4-40A8-B968-68C029020404}" type="datetime1">
               <a:rPr lang="en-US" smtClean="0"/>
-              <a:t>9/13/12</a:t>
+              <a:t>9/13/2012</a:t>
             </a:fld>
             <a:endParaRPr lang="en-US"/>
           </a:p>
@@ -6647,7 +6581,7 @@
           <a:p>
             <a:fld id="{A2C46440-81A3-41E1-AE3A-5848DA728CD2}" type="datetime1">
               <a:rPr lang="en-US" smtClean="0"/>
-              <a:t>9/13/12</a:t>
+              <a:t>9/13/2012</a:t>
             </a:fld>
             <a:endParaRPr lang="en-US"/>
           </a:p>
@@ -6738,7 +6672,7 @@
           <a:p>
             <a:fld id="{97FD17D7-9419-4A8F-9B2A-D9AEBBEE4645}" type="datetime1">
               <a:rPr lang="en-US" smtClean="0"/>
-              <a:t>9/13/12</a:t>
+              <a:t>9/13/2012</a:t>
             </a:fld>
             <a:endParaRPr lang="en-US"/>
           </a:p>
@@ -7011,7 +6945,7 @@
           <a:p>
             <a:fld id="{898AB767-2364-4983-96C9-1AF98BCD7BBF}" type="datetime1">
               <a:rPr lang="en-US" smtClean="0"/>
-              <a:t>9/13/12</a:t>
+              <a:t>9/13/2012</a:t>
             </a:fld>
             <a:endParaRPr lang="en-US"/>
           </a:p>
@@ -7260,7 +7194,7 @@
           <a:p>
             <a:fld id="{0997313F-EAC3-4D49-A621-0E6066639112}" type="datetime1">
               <a:rPr lang="en-US" smtClean="0"/>
-              <a:t>9/13/12</a:t>
+              <a:t>9/13/2012</a:t>
             </a:fld>
             <a:endParaRPr lang="en-US"/>
           </a:p>
@@ -7469,7 +7403,7 @@
           <a:p>
             <a:fld id="{1707B6C9-6E01-44ED-87EB-FEC9DE271BB7}" type="datetime1">
               <a:rPr lang="en-US" smtClean="0"/>
-              <a:t>9/13/12</a:t>
+              <a:t>9/13/2012</a:t>
             </a:fld>
             <a:endParaRPr lang="en-US"/>
           </a:p>
@@ -7921,7 +7855,7 @@
   <p:timing>
     <p:tnLst>
       <p:par>
-        <p:cTn xmlns:p14="http://schemas.microsoft.com/office/powerpoint/2010/main" id="1" dur="indefinite" restart="never" nodeType="tmRoot"/>
+        <p:cTn id="1" dur="indefinite" restart="never" nodeType="tmRoot"/>
       </p:par>
     </p:tnLst>
   </p:timing>
@@ -8165,15 +8099,7 @@
           <a:p>
             <a:r>
               <a:rPr lang="en-US" dirty="0" smtClean="0"/>
-              <a:t>All </a:t>
-            </a:r>
-            <a:r>
-              <a:rPr lang="en-US" dirty="0" smtClean="0"/>
-              <a:t>declarations </a:t>
-            </a:r>
-            <a:r>
-              <a:rPr lang="en-US" dirty="0" smtClean="0"/>
-              <a:t>of the send, receive operations and the free variables </a:t>
+              <a:t>All declarations of the send, receive operations and the free variables </a:t>
             </a:r>
             <a:endParaRPr lang="en-US" dirty="0"/>
           </a:p>
@@ -8338,7 +8264,7 @@
   <p:timing>
     <p:tnLst>
       <p:par>
-        <p:cTn xmlns:p14="http://schemas.microsoft.com/office/powerpoint/2010/main" id="1" dur="indefinite" restart="never" nodeType="tmRoot"/>
+        <p:cTn id="1" dur="indefinite" restart="never" nodeType="tmRoot"/>
       </p:par>
     </p:tnLst>
   </p:timing>
@@ -8403,7 +8329,7 @@
         </p:nvGraphicFramePr>
         <p:xfrm>
           <a:off x="1828800" y="1676400"/>
-          <a:ext cx="5247503" cy="2133599"/>
+          <a:ext cx="5247503" cy="2133600"/>
         </p:xfrm>
         <a:graphic>
           <a:graphicData uri="http://schemas.openxmlformats.org/drawingml/2006/table">
@@ -9664,17 +9590,6 @@
           </a:p>
           <a:p>
             <a:r>
-              <a:rPr lang="en-US" altLang="zh-CN" sz="2000" dirty="0">
-                <a:solidFill>
-                  <a:schemeClr val="accent2">
-                    <a:lumMod val="40000"/>
-                    <a:lumOff val="60000"/>
-                  </a:schemeClr>
-                </a:solidFill>
-              </a:rPr>
-              <a:t>(define </a:t>
-            </a:r>
-            <a:r>
               <a:rPr lang="en-US" altLang="zh-CN" sz="2000" i="1" dirty="0">
                 <a:solidFill>
                   <a:schemeClr val="accent2">
@@ -9683,29 +9598,7 @@
                   </a:schemeClr>
                 </a:solidFill>
               </a:rPr>
-              <a:t>R</a:t>
-            </a:r>
-            <a:r>
-              <a:rPr lang="en-US" altLang="zh-CN" sz="2000" i="1" baseline="-25000" dirty="0">
-                <a:solidFill>
-                  <a:schemeClr val="accent2">
-                    <a:lumMod val="40000"/>
-                    <a:lumOff val="60000"/>
-                  </a:schemeClr>
-                </a:solidFill>
-              </a:rPr>
-              <a:t>0,2</a:t>
-            </a:r>
-            <a:r>
-              <a:rPr lang="en-US" altLang="zh-CN" sz="2000" i="1" dirty="0">
-                <a:solidFill>
-                  <a:schemeClr val="accent2">
-                    <a:lumMod val="40000"/>
-                    <a:lumOff val="60000"/>
-                  </a:schemeClr>
-                </a:solidFill>
-              </a:rPr>
-              <a:t>::</a:t>
+              <a:t>(define R0,2::</a:t>
             </a:r>
             <a:r>
               <a:rPr lang="en-US" altLang="zh-CN" sz="2000" i="1" dirty="0" err="1">
@@ -9727,20 +9620,9 @@
                   </a:schemeClr>
                 </a:solidFill>
               </a:rPr>
-              <a:t>)</a:t>
-            </a:r>
-            <a:r>
-              <a:rPr lang="en-US" altLang="zh-CN" sz="2000" dirty="0">
-                <a:solidFill>
-                  <a:schemeClr val="accent2">
-                    <a:lumMod val="40000"/>
-                    <a:lumOff val="60000"/>
-                  </a:schemeClr>
-                </a:solidFill>
-              </a:rPr>
-              <a:t> </a:t>
-            </a:r>
-            <a:endParaRPr lang="en-US" altLang="zh-CN" sz="2000" dirty="0" smtClean="0">
+              <a:t>) </a:t>
+            </a:r>
+            <a:endParaRPr lang="en-US" altLang="zh-CN" sz="2000" i="1" dirty="0">
               <a:solidFill>
                 <a:schemeClr val="accent2">
                   <a:lumMod val="40000"/>
@@ -9915,7 +9797,7 @@
   <p:timing>
     <p:tnLst>
       <p:par>
-        <p:cTn xmlns:p14="http://schemas.microsoft.com/office/powerpoint/2010/main" id="1" dur="indefinite" restart="never" nodeType="tmRoot"/>
+        <p:cTn id="1" dur="indefinite" restart="never" nodeType="tmRoot"/>
       </p:par>
     </p:tnLst>
   </p:timing>
@@ -9980,7 +9862,7 @@
         </p:nvGraphicFramePr>
         <p:xfrm>
           <a:off x="1828800" y="1676400"/>
-          <a:ext cx="5247503" cy="2133599"/>
+          <a:ext cx="5247503" cy="2133600"/>
         </p:xfrm>
         <a:graphic>
           <a:graphicData uri="http://schemas.openxmlformats.org/drawingml/2006/table">
@@ -11536,7 +11418,7 @@
   <p:timing>
     <p:tnLst>
       <p:par>
-        <p:cTn xmlns:p14="http://schemas.microsoft.com/office/powerpoint/2010/main" id="1" dur="indefinite" restart="never" nodeType="tmRoot"/>
+        <p:cTn id="1" dur="indefinite" restart="never" nodeType="tmRoot"/>
       </p:par>
     </p:tnLst>
   </p:timing>
@@ -11601,7 +11483,7 @@
         </p:nvGraphicFramePr>
         <p:xfrm>
           <a:off x="1828800" y="1676400"/>
-          <a:ext cx="5247503" cy="2133599"/>
+          <a:ext cx="5247503" cy="2133600"/>
         </p:xfrm>
         <a:graphic>
           <a:graphicData uri="http://schemas.openxmlformats.org/drawingml/2006/table">
@@ -12889,7 +12771,7 @@
   <p:timing>
     <p:tnLst>
       <p:par>
-        <p:cTn xmlns:p14="http://schemas.microsoft.com/office/powerpoint/2010/main" id="1" dur="indefinite" restart="never" nodeType="tmRoot"/>
+        <p:cTn id="1" dur="indefinite" restart="never" nodeType="tmRoot"/>
       </p:par>
     </p:tnLst>
   </p:timing>
@@ -12954,7 +12836,7 @@
         </p:nvGraphicFramePr>
         <p:xfrm>
           <a:off x="1828800" y="1676400"/>
-          <a:ext cx="5247503" cy="2133599"/>
+          <a:ext cx="5247503" cy="2133600"/>
         </p:xfrm>
         <a:graphic>
           <a:graphicData uri="http://schemas.openxmlformats.org/drawingml/2006/table">
@@ -14504,7 +14386,7 @@
   <p:timing>
     <p:tnLst>
       <p:par>
-        <p:cTn xmlns:p14="http://schemas.microsoft.com/office/powerpoint/2010/main" id="1" dur="indefinite" restart="never" nodeType="tmRoot"/>
+        <p:cTn id="1" dur="indefinite" restart="never" nodeType="tmRoot"/>
       </p:par>
     </p:tnLst>
   </p:timing>
@@ -14925,7 +14807,7 @@
   <p:timing>
     <p:tnLst>
       <p:par>
-        <p:cTn xmlns:p14="http://schemas.microsoft.com/office/powerpoint/2010/main" id="1" dur="indefinite" restart="never" nodeType="tmRoot"/>
+        <p:cTn id="1" dur="indefinite" restart="never" nodeType="tmRoot"/>
       </p:par>
     </p:tnLst>
   </p:timing>
@@ -14990,7 +14872,7 @@
         </p:nvGraphicFramePr>
         <p:xfrm>
           <a:off x="1828800" y="1676400"/>
-          <a:ext cx="5247503" cy="2133599"/>
+          <a:ext cx="5247503" cy="2133600"/>
         </p:xfrm>
         <a:graphic>
           <a:graphicData uri="http://schemas.openxmlformats.org/drawingml/2006/table">
@@ -16208,7 +16090,7 @@
         </p:nvGraphicFramePr>
         <p:xfrm>
           <a:off x="1905000" y="4267200"/>
-          <a:ext cx="5247503" cy="2133599"/>
+          <a:ext cx="5247503" cy="2133600"/>
         </p:xfrm>
         <a:graphic>
           <a:graphicData uri="http://schemas.openxmlformats.org/drawingml/2006/table">
@@ -17506,7 +17388,7 @@
   <p:timing>
     <p:tnLst>
       <p:par>
-        <p:cTn xmlns:p14="http://schemas.microsoft.com/office/powerpoint/2010/main" id="1" dur="indefinite" restart="never" nodeType="tmRoot"/>
+        <p:cTn id="1" dur="indefinite" restart="never" nodeType="tmRoot"/>
       </p:par>
     </p:tnLst>
   </p:timing>
@@ -18938,18 +18820,18 @@
   <p:clrMapOvr>
     <a:masterClrMapping/>
   </p:clrMapOvr>
-  <mc:AlternateContent xmlns:mc="http://schemas.openxmlformats.org/markup-compatibility/2006">
-    <mc:Choice xmlns:p14="http://schemas.microsoft.com/office/powerpoint/2010/main" Requires="p14">
+  <mc:AlternateContent xmlns:mc="http://schemas.openxmlformats.org/markup-compatibility/2006" xmlns:p14="http://schemas.microsoft.com/office/powerpoint/2010/main">
+    <mc:Choice Requires="p14">
       <p:transition spd="slow" p14:dur="2000"/>
     </mc:Choice>
-    <mc:Fallback>
+    <mc:Fallback xmlns="">
       <p:transition xmlns:p14="http://schemas.microsoft.com/office/powerpoint/2010/main" spd="slow"/>
     </mc:Fallback>
   </mc:AlternateContent>
   <p:timing>
     <p:tnLst>
       <p:par>
-        <p:cTn xmlns:p14="http://schemas.microsoft.com/office/powerpoint/2010/main" id="1" dur="indefinite" restart="never" nodeType="tmRoot"/>
+        <p:cTn id="1" dur="indefinite" restart="never" nodeType="tmRoot"/>
       </p:par>
     </p:tnLst>
   </p:timing>
@@ -20507,18 +20389,18 @@
   <p:clrMapOvr>
     <a:masterClrMapping/>
   </p:clrMapOvr>
-  <mc:AlternateContent xmlns:mc="http://schemas.openxmlformats.org/markup-compatibility/2006">
-    <mc:Choice xmlns:p14="http://schemas.microsoft.com/office/powerpoint/2010/main" Requires="p14">
+  <mc:AlternateContent xmlns:mc="http://schemas.openxmlformats.org/markup-compatibility/2006" xmlns:p14="http://schemas.microsoft.com/office/powerpoint/2010/main">
+    <mc:Choice Requires="p14">
       <p:transition spd="slow" p14:dur="2000"/>
     </mc:Choice>
-    <mc:Fallback>
+    <mc:Fallback xmlns="">
       <p:transition xmlns:p14="http://schemas.microsoft.com/office/powerpoint/2010/main" spd="slow"/>
     </mc:Fallback>
   </mc:AlternateContent>
   <p:timing>
     <p:tnLst>
       <p:par>
-        <p:cTn xmlns:p14="http://schemas.microsoft.com/office/powerpoint/2010/main" id="1" dur="indefinite" restart="never" nodeType="tmRoot"/>
+        <p:cTn id="1" dur="indefinite" restart="never" nodeType="tmRoot"/>
       </p:par>
     </p:tnLst>
   </p:timing>
@@ -20559,15 +20441,11 @@
           <a:p>
             <a:r>
               <a:rPr lang="en-US" dirty="0" smtClean="0"/>
-              <a:t>Theorem 1 </a:t>
-            </a:r>
-            <a:r>
-              <a:rPr lang="en-US" altLang="zh-CN" dirty="0"/>
-              <a:t>–</a:t>
+              <a:t>Proof </a:t>
             </a:r>
             <a:r>
               <a:rPr lang="en-US" dirty="0" smtClean="0"/>
-              <a:t> Proof Sketch</a:t>
+              <a:t>Sketch</a:t>
             </a:r>
             <a:endParaRPr lang="en-US" dirty="0"/>
           </a:p>
@@ -21377,7 +21255,7 @@
   <p:timing>
     <p:tnLst>
       <p:par>
-        <p:cTn xmlns:p14="http://schemas.microsoft.com/office/powerpoint/2010/main" id="1" dur="indefinite" restart="never" nodeType="tmRoot"/>
+        <p:cTn id="1" dur="indefinite" restart="never" nodeType="tmRoot"/>
       </p:par>
     </p:tnLst>
   </p:timing>
@@ -21801,8 +21679,10 @@
                           <a:latin typeface="Lucida Console" pitchFamily="49" charset="0"/>
                           <a:cs typeface="Times New Roman" pitchFamily="18" charset="0"/>
                         </a:rPr>
-                        <a:t> if(b &gt; 0</a:t>
-                      </a:r>
+                        <a:t> if(b &gt; 0)</a:t>
+                      </a:r>
+                    </a:p>
+                    <a:p>
                       <a:r>
                         <a:rPr lang="en-US" baseline="0" dirty="0" smtClean="0">
                           <a:solidFill>
@@ -21811,46 +21691,7 @@
                           <a:latin typeface="Lucida Console" pitchFamily="49" charset="0"/>
                           <a:cs typeface="Times New Roman" pitchFamily="18" charset="0"/>
                         </a:rPr>
-                        <a:t>)</a:t>
-                      </a:r>
-                      <a:endParaRPr lang="en-US" baseline="0" dirty="0" smtClean="0">
-                        <a:solidFill>
-                          <a:schemeClr val="tx1"/>
-                        </a:solidFill>
-                        <a:latin typeface="Lucida Console" pitchFamily="49" charset="0"/>
-                        <a:cs typeface="Times New Roman" pitchFamily="18" charset="0"/>
-                      </a:endParaRPr>
-                    </a:p>
-                    <a:p>
-                      <a:r>
-                        <a:rPr lang="en-US" baseline="0" dirty="0" smtClean="0">
-                          <a:solidFill>
-                            <a:schemeClr val="tx1"/>
-                          </a:solidFill>
-                          <a:latin typeface="Lucida Console" pitchFamily="49" charset="0"/>
-                          <a:cs typeface="Times New Roman" pitchFamily="18" charset="0"/>
-                        </a:rPr>
-                        <a:t>      09 </a:t>
-                      </a:r>
-                      <a:r>
-                        <a:rPr lang="en-US" baseline="0" dirty="0" smtClean="0">
-                          <a:solidFill>
-                            <a:schemeClr val="tx1"/>
-                          </a:solidFill>
-                          <a:latin typeface="Lucida Console" pitchFamily="49" charset="0"/>
-                          <a:cs typeface="Times New Roman" pitchFamily="18" charset="0"/>
-                        </a:rPr>
-                        <a:t>   assert</a:t>
-                      </a:r>
-                      <a:r>
-                        <a:rPr lang="en-US" baseline="0" dirty="0" smtClean="0">
-                          <a:solidFill>
-                            <a:schemeClr val="tx1"/>
-                          </a:solidFill>
-                          <a:latin typeface="Lucida Console" pitchFamily="49" charset="0"/>
-                          <a:cs typeface="Times New Roman" pitchFamily="18" charset="0"/>
-                        </a:rPr>
-                        <a:t>(a == 4);</a:t>
+                        <a:t>      09    assert(a == 4);</a:t>
                       </a:r>
                     </a:p>
                     <a:p>
@@ -21926,7 +21767,7 @@
   <p:timing>
     <p:tnLst>
       <p:par>
-        <p:cTn xmlns:p14="http://schemas.microsoft.com/office/powerpoint/2010/main" id="1" dur="indefinite" restart="never" nodeType="tmRoot"/>
+        <p:cTn id="1" dur="indefinite" restart="never" nodeType="tmRoot"/>
       </p:par>
     </p:tnLst>
   </p:timing>
@@ -23285,7 +23126,7 @@
   <p:timing>
     <p:tnLst>
       <p:par>
-        <p:cTn xmlns:p14="http://schemas.microsoft.com/office/powerpoint/2010/main" id="1" dur="indefinite" restart="never" nodeType="tmRoot"/>
+        <p:cTn id="1" dur="indefinite" restart="never" nodeType="tmRoot"/>
       </p:par>
     </p:tnLst>
   </p:timing>
@@ -24787,7 +24628,7 @@
   <p:timing>
     <p:tnLst>
       <p:par>
-        <p:cTn xmlns:p14="http://schemas.microsoft.com/office/powerpoint/2010/main" id="1" dur="indefinite" restart="never" nodeType="tmRoot"/>
+        <p:cTn id="1" dur="indefinite" restart="never" nodeType="tmRoot"/>
       </p:par>
     </p:tnLst>
   </p:timing>
@@ -25165,7 +25006,7 @@
   <p:timing>
     <p:tnLst>
       <p:par>
-        <p:cTn xmlns:p14="http://schemas.microsoft.com/office/powerpoint/2010/main" id="1" dur="indefinite" restart="never" nodeType="tmRoot"/>
+        <p:cTn id="1" dur="indefinite" restart="never" nodeType="tmRoot"/>
       </p:par>
     </p:tnLst>
   </p:timing>
@@ -25228,7 +25069,7 @@
         </p:nvGraphicFramePr>
         <p:xfrm>
           <a:off x="1524000" y="2895600"/>
-          <a:ext cx="6096000" cy="1285239"/>
+          <a:ext cx="6096000" cy="1285240"/>
         </p:xfrm>
         <a:graphic>
           <a:graphicData uri="http://schemas.openxmlformats.org/drawingml/2006/table">
@@ -25542,7 +25383,7 @@
   <p:timing>
     <p:tnLst>
       <p:par>
-        <p:cTn xmlns:p14="http://schemas.microsoft.com/office/powerpoint/2010/main" id="1" dur="indefinite" restart="never" nodeType="tmRoot"/>
+        <p:cTn id="1" dur="indefinite" restart="never" nodeType="tmRoot"/>
       </p:par>
     </p:tnLst>
   </p:timing>
@@ -25959,7 +25800,7 @@
   <p:timing>
     <p:tnLst>
       <p:par>
-        <p:cTn xmlns:p14="http://schemas.microsoft.com/office/powerpoint/2010/main" id="1" dur="indefinite" restart="never" nodeType="tmRoot"/>
+        <p:cTn id="1" dur="indefinite" restart="never" nodeType="tmRoot"/>
       </p:par>
     </p:tnLst>
   </p:timing>
@@ -26680,7 +26521,7 @@
   <p:timing>
     <p:tnLst>
       <p:par>
-        <p:cTn xmlns:p14="http://schemas.microsoft.com/office/powerpoint/2010/main" id="1" dur="indefinite" restart="never" nodeType="tmRoot"/>
+        <p:cTn id="1" dur="indefinite" restart="never" nodeType="tmRoot"/>
       </p:par>
     </p:tnLst>
   </p:timing>
@@ -26736,14 +26577,14 @@
           <p:nvPr>
             <p:extLst>
               <p:ext uri="{D42A27DB-BD31-4B8C-83A1-F6EECF244321}">
-                <p14:modId xmlns:p14="http://schemas.microsoft.com/office/powerpoint/2010/main" val="3729988617"/>
+                <p14:modId xmlns:p14="http://schemas.microsoft.com/office/powerpoint/2010/main" val="4158357752"/>
               </p:ext>
             </p:extLst>
           </p:nvPr>
         </p:nvGraphicFramePr>
         <p:xfrm>
           <a:off x="1524000" y="1651000"/>
-          <a:ext cx="6553200" cy="1849120"/>
+          <a:ext cx="6553200" cy="2926080"/>
         </p:xfrm>
         <a:graphic>
           <a:graphicData uri="http://schemas.openxmlformats.org/drawingml/2006/table">
@@ -26946,7 +26787,28 @@
                           </a:solidFill>
                           <a:latin typeface="Lucida Console" pitchFamily="49" charset="0"/>
                         </a:rPr>
-                        <a:t>(*,a,&amp;h1)</a:t>
+                        <a:t>(*,a,&amp;h1</a:t>
+                      </a:r>
+                      <a:r>
+                        <a:rPr lang="en-US" dirty="0" smtClean="0">
+                          <a:solidFill>
+                            <a:schemeClr val="tx1"/>
+                          </a:solidFill>
+                          <a:latin typeface="Lucida Console" pitchFamily="49" charset="0"/>
+                        </a:rPr>
+                        <a:t>)</a:t>
+                      </a:r>
+                    </a:p>
+                    <a:p>
+                      <a:pPr algn="l"/>
+                      <a:r>
+                        <a:rPr lang="en-US" dirty="0" smtClean="0">
+                          <a:solidFill>
+                            <a:schemeClr val="tx1"/>
+                          </a:solidFill>
+                          <a:latin typeface="Lucida Console" pitchFamily="49" charset="0"/>
+                        </a:rPr>
+                        <a:t>W(&amp;h1)</a:t>
                       </a:r>
                       <a:endParaRPr lang="en-US" dirty="0">
                         <a:solidFill>
@@ -27012,7 +26874,27 @@
                           </a:solidFill>
                           <a:latin typeface="Lucida Console" pitchFamily="49" charset="0"/>
                         </a:rPr>
-                        <a:t>(0,”2”,&amp;h5)</a:t>
+                        <a:t>(0,”2”,&amp;h5</a:t>
+                      </a:r>
+                      <a:r>
+                        <a:rPr lang="en-US" dirty="0" smtClean="0">
+                          <a:solidFill>
+                            <a:schemeClr val="tx1"/>
+                          </a:solidFill>
+                          <a:latin typeface="Lucida Console" pitchFamily="49" charset="0"/>
+                        </a:rPr>
+                        <a:t>)</a:t>
+                      </a:r>
+                    </a:p>
+                    <a:p>
+                      <a:r>
+                        <a:rPr lang="en-US" dirty="0" smtClean="0">
+                          <a:solidFill>
+                            <a:schemeClr val="tx1"/>
+                          </a:solidFill>
+                          <a:latin typeface="Lucida Console" pitchFamily="49" charset="0"/>
+                        </a:rPr>
+                        <a:t>W(&amp;h5)</a:t>
                       </a:r>
                       <a:endParaRPr lang="en-US" dirty="0">
                         <a:solidFill>
@@ -27078,7 +26960,27 @@
                           </a:solidFill>
                           <a:latin typeface="Lucida Console" pitchFamily="49" charset="0"/>
                         </a:rPr>
-                        <a:t>(0,”4”,&amp;h8)</a:t>
+                        <a:t>(0,”4”,&amp;h8</a:t>
+                      </a:r>
+                      <a:r>
+                        <a:rPr lang="en-US" dirty="0" smtClean="0">
+                          <a:solidFill>
+                            <a:schemeClr val="tx1"/>
+                          </a:solidFill>
+                          <a:latin typeface="Lucida Console" pitchFamily="49" charset="0"/>
+                        </a:rPr>
+                        <a:t>)</a:t>
+                      </a:r>
+                    </a:p>
+                    <a:p>
+                      <a:r>
+                        <a:rPr lang="en-US" dirty="0" smtClean="0">
+                          <a:solidFill>
+                            <a:schemeClr val="tx1"/>
+                          </a:solidFill>
+                          <a:latin typeface="Lucida Console" pitchFamily="49" charset="0"/>
+                        </a:rPr>
+                        <a:t>W(&amp;h8)</a:t>
                       </a:r>
                       <a:endParaRPr lang="en-US" dirty="0">
                         <a:solidFill>
@@ -27163,46 +27065,18 @@
                           </a:solidFill>
                           <a:latin typeface="Lucida Console" pitchFamily="49" charset="0"/>
                         </a:rPr>
-                        <a:t>(*,b,&amp;h2)</a:t>
-                      </a:r>
-                      <a:endParaRPr lang="en-US" dirty="0">
-                        <a:solidFill>
-                          <a:schemeClr val="tx1"/>
-                        </a:solidFill>
-                        <a:latin typeface="Lucida Console" pitchFamily="49" charset="0"/>
-                      </a:endParaRPr>
-                    </a:p>
-                  </a:txBody>
-                  <a:tcPr>
-                    <a:lnL w="12700" cmpd="sng">
-                      <a:noFill/>
-                    </a:lnL>
-                    <a:lnR w="12700" cmpd="sng">
-                      <a:noFill/>
-                    </a:lnR>
-                    <a:lnT w="12700" cmpd="sng">
-                      <a:noFill/>
-                    </a:lnT>
-                    <a:lnB w="12700" cmpd="sng">
-                      <a:noFill/>
-                    </a:lnB>
-                    <a:lnTlToBr w="12700" cmpd="sng">
-                      <a:noFill/>
-                      <a:prstDash val="solid"/>
-                    </a:lnTlToBr>
-                    <a:lnBlToTr w="12700" cmpd="sng">
-                      <a:noFill/>
-                      <a:prstDash val="solid"/>
-                    </a:lnBlToTr>
-                    <a:solidFill>
-                      <a:schemeClr val="bg1"/>
-                    </a:solidFill>
-                  </a:tcPr>
-                </a:tc>
-                <a:tc>
-                  <a:txBody>
-                    <a:bodyPr/>
-                    <a:lstStyle/>
+                        <a:t>(*,b,&amp;h2</a:t>
+                      </a:r>
+                      <a:r>
+                        <a:rPr lang="en-US" dirty="0" smtClean="0">
+                          <a:solidFill>
+                            <a:schemeClr val="tx1"/>
+                          </a:solidFill>
+                          <a:latin typeface="Lucida Console" pitchFamily="49" charset="0"/>
+                        </a:rPr>
+                        <a:t>)</a:t>
+                      </a:r>
+                    </a:p>
                     <a:p>
                       <a:pPr marL="0" marR="0" indent="0" algn="l" defTabSz="914400" rtl="0" eaLnBrk="1" fontAlgn="auto" latinLnBrk="0" hangingPunct="1">
                         <a:lnSpc>
@@ -27228,25 +27102,7 @@
                           </a:solidFill>
                           <a:latin typeface="Lucida Console" pitchFamily="49" charset="0"/>
                         </a:rPr>
-                        <a:t>R</a:t>
-                      </a:r>
-                      <a:r>
-                        <a:rPr lang="en-US" baseline="-25000" dirty="0" smtClean="0">
-                          <a:solidFill>
-                            <a:schemeClr val="tx1"/>
-                          </a:solidFill>
-                          <a:latin typeface="Lucida Console" pitchFamily="49" charset="0"/>
-                        </a:rPr>
-                        <a:t>1,2</a:t>
-                      </a:r>
-                      <a:r>
-                        <a:rPr lang="en-US" dirty="0" smtClean="0">
-                          <a:solidFill>
-                            <a:schemeClr val="tx1"/>
-                          </a:solidFill>
-                          <a:latin typeface="Lucida Console" pitchFamily="49" charset="0"/>
-                        </a:rPr>
-                        <a:t>(*,d,&amp;h6)</a:t>
+                        <a:t>W(&amp;h2)</a:t>
                       </a:r>
                       <a:endParaRPr lang="en-US" dirty="0">
                         <a:solidFill>
@@ -27282,47 +27138,6 @@
                     </a:solidFill>
                   </a:tcPr>
                 </a:tc>
-                <a:tc>
-                  <a:txBody>
-                    <a:bodyPr/>
-                    <a:lstStyle/>
-                    <a:p>
-                      <a:endParaRPr lang="en-US" dirty="0">
-                        <a:solidFill>
-                          <a:schemeClr val="tx1"/>
-                        </a:solidFill>
-                        <a:latin typeface="Lucida Console" pitchFamily="49" charset="0"/>
-                      </a:endParaRPr>
-                    </a:p>
-                  </a:txBody>
-                  <a:tcPr>
-                    <a:lnL w="12700" cmpd="sng">
-                      <a:noFill/>
-                    </a:lnL>
-                    <a:lnR w="12700" cmpd="sng">
-                      <a:noFill/>
-                    </a:lnR>
-                    <a:lnT w="12700" cmpd="sng">
-                      <a:noFill/>
-                    </a:lnT>
-                    <a:lnB w="12700" cmpd="sng">
-                      <a:noFill/>
-                    </a:lnB>
-                    <a:lnTlToBr w="12700" cmpd="sng">
-                      <a:noFill/>
-                      <a:prstDash val="solid"/>
-                    </a:lnTlToBr>
-                    <a:lnBlToTr w="12700" cmpd="sng">
-                      <a:noFill/>
-                      <a:prstDash val="solid"/>
-                    </a:lnBlToTr>
-                    <a:solidFill>
-                      <a:schemeClr val="bg1"/>
-                    </a:solidFill>
-                  </a:tcPr>
-                </a:tc>
-              </a:tr>
-              <a:tr h="370840">
                 <a:tc>
                   <a:txBody>
                     <a:bodyPr/>
@@ -27352,7 +27167,7 @@
                           </a:solidFill>
                           <a:latin typeface="Lucida Console" pitchFamily="49" charset="0"/>
                         </a:rPr>
-                        <a:t>S</a:t>
+                        <a:t>R</a:t>
                       </a:r>
                       <a:r>
                         <a:rPr lang="en-US" baseline="-25000" dirty="0" smtClean="0">
@@ -27361,7 +27176,7 @@
                           </a:solidFill>
                           <a:latin typeface="Lucida Console" pitchFamily="49" charset="0"/>
                         </a:rPr>
-                        <a:t>0,3</a:t>
+                        <a:t>1,2</a:t>
                       </a:r>
                       <a:r>
                         <a:rPr lang="en-US" dirty="0" smtClean="0">
@@ -27370,46 +27185,18 @@
                           </a:solidFill>
                           <a:latin typeface="Lucida Console" pitchFamily="49" charset="0"/>
                         </a:rPr>
-                        <a:t>(1,”1”,&amp;h3)</a:t>
-                      </a:r>
-                      <a:endParaRPr lang="en-US" dirty="0">
-                        <a:solidFill>
-                          <a:schemeClr val="tx1"/>
-                        </a:solidFill>
-                        <a:latin typeface="Lucida Console" pitchFamily="49" charset="0"/>
-                      </a:endParaRPr>
-                    </a:p>
-                  </a:txBody>
-                  <a:tcPr>
-                    <a:lnL w="12700" cmpd="sng">
-                      <a:noFill/>
-                    </a:lnL>
-                    <a:lnR w="12700" cmpd="sng">
-                      <a:noFill/>
-                    </a:lnR>
-                    <a:lnT w="12700" cmpd="sng">
-                      <a:noFill/>
-                    </a:lnT>
-                    <a:lnB w="12700" cmpd="sng">
-                      <a:noFill/>
-                    </a:lnB>
-                    <a:lnTlToBr w="12700" cmpd="sng">
-                      <a:noFill/>
-                      <a:prstDash val="solid"/>
-                    </a:lnTlToBr>
-                    <a:lnBlToTr w="12700" cmpd="sng">
-                      <a:noFill/>
-                      <a:prstDash val="solid"/>
-                    </a:lnBlToTr>
-                    <a:solidFill>
-                      <a:schemeClr val="bg1"/>
-                    </a:solidFill>
-                  </a:tcPr>
-                </a:tc>
-                <a:tc>
-                  <a:txBody>
-                    <a:bodyPr/>
-                    <a:lstStyle/>
+                        <a:t>(*,d,&amp;h6</a:t>
+                      </a:r>
+                      <a:r>
+                        <a:rPr lang="en-US" dirty="0" smtClean="0">
+                          <a:solidFill>
+                            <a:schemeClr val="tx1"/>
+                          </a:solidFill>
+                          <a:latin typeface="Lucida Console" pitchFamily="49" charset="0"/>
+                        </a:rPr>
+                        <a:t>)</a:t>
+                      </a:r>
+                    </a:p>
                     <a:p>
                       <a:pPr marL="0" marR="0" indent="0" algn="l" defTabSz="914400" rtl="0" eaLnBrk="1" fontAlgn="auto" latinLnBrk="0" hangingPunct="1">
                         <a:lnSpc>
@@ -27435,25 +27222,7 @@
                           </a:solidFill>
                           <a:latin typeface="Lucida Console" pitchFamily="49" charset="0"/>
                         </a:rPr>
-                        <a:t>S</a:t>
-                      </a:r>
-                      <a:r>
-                        <a:rPr lang="en-US" baseline="-25000" dirty="0" smtClean="0">
-                          <a:solidFill>
-                            <a:schemeClr val="tx1"/>
-                          </a:solidFill>
-                          <a:latin typeface="Lucida Console" pitchFamily="49" charset="0"/>
-                        </a:rPr>
-                        <a:t>1,3</a:t>
-                      </a:r>
-                      <a:r>
-                        <a:rPr lang="en-US" dirty="0" smtClean="0">
-                          <a:solidFill>
-                            <a:schemeClr val="tx1"/>
-                          </a:solidFill>
-                          <a:latin typeface="Lucida Console" pitchFamily="49" charset="0"/>
-                        </a:rPr>
-                        <a:t>(0,”3”,&amp;h7)</a:t>
+                        <a:t>W(&amp;h6)</a:t>
                       </a:r>
                       <a:endParaRPr lang="en-US" dirty="0">
                         <a:solidFill>
@@ -27559,6 +27328,287 @@
                           </a:solidFill>
                           <a:latin typeface="Lucida Console" pitchFamily="49" charset="0"/>
                         </a:rPr>
+                        <a:t>S</a:t>
+                      </a:r>
+                      <a:r>
+                        <a:rPr lang="en-US" baseline="-25000" dirty="0" smtClean="0">
+                          <a:solidFill>
+                            <a:schemeClr val="tx1"/>
+                          </a:solidFill>
+                          <a:latin typeface="Lucida Console" pitchFamily="49" charset="0"/>
+                        </a:rPr>
+                        <a:t>0,3</a:t>
+                      </a:r>
+                      <a:r>
+                        <a:rPr lang="en-US" dirty="0" smtClean="0">
+                          <a:solidFill>
+                            <a:schemeClr val="tx1"/>
+                          </a:solidFill>
+                          <a:latin typeface="Lucida Console" pitchFamily="49" charset="0"/>
+                        </a:rPr>
+                        <a:t>(1,”1”,&amp;h3</a:t>
+                      </a:r>
+                      <a:r>
+                        <a:rPr lang="en-US" dirty="0" smtClean="0">
+                          <a:solidFill>
+                            <a:schemeClr val="tx1"/>
+                          </a:solidFill>
+                          <a:latin typeface="Lucida Console" pitchFamily="49" charset="0"/>
+                        </a:rPr>
+                        <a:t>)</a:t>
+                      </a:r>
+                    </a:p>
+                    <a:p>
+                      <a:pPr marL="0" marR="0" indent="0" algn="l" defTabSz="914400" rtl="0" eaLnBrk="1" fontAlgn="auto" latinLnBrk="0" hangingPunct="1">
+                        <a:lnSpc>
+                          <a:spcPct val="100000"/>
+                        </a:lnSpc>
+                        <a:spcBef>
+                          <a:spcPts val="0"/>
+                        </a:spcBef>
+                        <a:spcAft>
+                          <a:spcPts val="0"/>
+                        </a:spcAft>
+                        <a:buClrTx/>
+                        <a:buSzTx/>
+                        <a:buFontTx/>
+                        <a:buNone/>
+                        <a:tabLst/>
+                        <a:defRPr/>
+                      </a:pPr>
+                      <a:r>
+                        <a:rPr lang="en-US" dirty="0" smtClean="0">
+                          <a:solidFill>
+                            <a:schemeClr val="tx1"/>
+                          </a:solidFill>
+                          <a:latin typeface="Lucida Console" pitchFamily="49" charset="0"/>
+                        </a:rPr>
+                        <a:t>W(&amp;h3)</a:t>
+                      </a:r>
+                      <a:endParaRPr lang="en-US" dirty="0">
+                        <a:solidFill>
+                          <a:schemeClr val="tx1"/>
+                        </a:solidFill>
+                        <a:latin typeface="Lucida Console" pitchFamily="49" charset="0"/>
+                      </a:endParaRPr>
+                    </a:p>
+                  </a:txBody>
+                  <a:tcPr>
+                    <a:lnL w="12700" cmpd="sng">
+                      <a:noFill/>
+                    </a:lnL>
+                    <a:lnR w="12700" cmpd="sng">
+                      <a:noFill/>
+                    </a:lnR>
+                    <a:lnT w="12700" cmpd="sng">
+                      <a:noFill/>
+                    </a:lnT>
+                    <a:lnB w="12700" cmpd="sng">
+                      <a:noFill/>
+                    </a:lnB>
+                    <a:lnTlToBr w="12700" cmpd="sng">
+                      <a:noFill/>
+                      <a:prstDash val="solid"/>
+                    </a:lnTlToBr>
+                    <a:lnBlToTr w="12700" cmpd="sng">
+                      <a:noFill/>
+                      <a:prstDash val="solid"/>
+                    </a:lnBlToTr>
+                    <a:solidFill>
+                      <a:schemeClr val="bg1"/>
+                    </a:solidFill>
+                  </a:tcPr>
+                </a:tc>
+                <a:tc>
+                  <a:txBody>
+                    <a:bodyPr/>
+                    <a:lstStyle/>
+                    <a:p>
+                      <a:pPr marL="0" marR="0" indent="0" algn="l" defTabSz="914400" rtl="0" eaLnBrk="1" fontAlgn="auto" latinLnBrk="0" hangingPunct="1">
+                        <a:lnSpc>
+                          <a:spcPct val="100000"/>
+                        </a:lnSpc>
+                        <a:spcBef>
+                          <a:spcPts val="0"/>
+                        </a:spcBef>
+                        <a:spcAft>
+                          <a:spcPts val="0"/>
+                        </a:spcAft>
+                        <a:buClrTx/>
+                        <a:buSzTx/>
+                        <a:buFontTx/>
+                        <a:buNone/>
+                        <a:tabLst/>
+                        <a:defRPr/>
+                      </a:pPr>
+                      <a:r>
+                        <a:rPr lang="en-US" dirty="0" smtClean="0">
+                          <a:solidFill>
+                            <a:schemeClr val="tx1"/>
+                          </a:solidFill>
+                          <a:latin typeface="Lucida Console" pitchFamily="49" charset="0"/>
+                        </a:rPr>
+                        <a:t>S</a:t>
+                      </a:r>
+                      <a:r>
+                        <a:rPr lang="en-US" baseline="-25000" dirty="0" smtClean="0">
+                          <a:solidFill>
+                            <a:schemeClr val="tx1"/>
+                          </a:solidFill>
+                          <a:latin typeface="Lucida Console" pitchFamily="49" charset="0"/>
+                        </a:rPr>
+                        <a:t>1,3</a:t>
+                      </a:r>
+                      <a:r>
+                        <a:rPr lang="en-US" dirty="0" smtClean="0">
+                          <a:solidFill>
+                            <a:schemeClr val="tx1"/>
+                          </a:solidFill>
+                          <a:latin typeface="Lucida Console" pitchFamily="49" charset="0"/>
+                        </a:rPr>
+                        <a:t>(0,”3”,&amp;h7</a:t>
+                      </a:r>
+                      <a:r>
+                        <a:rPr lang="en-US" dirty="0" smtClean="0">
+                          <a:solidFill>
+                            <a:schemeClr val="tx1"/>
+                          </a:solidFill>
+                          <a:latin typeface="Lucida Console" pitchFamily="49" charset="0"/>
+                        </a:rPr>
+                        <a:t>)</a:t>
+                      </a:r>
+                    </a:p>
+                    <a:p>
+                      <a:pPr marL="0" marR="0" indent="0" algn="l" defTabSz="914400" rtl="0" eaLnBrk="1" fontAlgn="auto" latinLnBrk="0" hangingPunct="1">
+                        <a:lnSpc>
+                          <a:spcPct val="100000"/>
+                        </a:lnSpc>
+                        <a:spcBef>
+                          <a:spcPts val="0"/>
+                        </a:spcBef>
+                        <a:spcAft>
+                          <a:spcPts val="0"/>
+                        </a:spcAft>
+                        <a:buClrTx/>
+                        <a:buSzTx/>
+                        <a:buFontTx/>
+                        <a:buNone/>
+                        <a:tabLst/>
+                        <a:defRPr/>
+                      </a:pPr>
+                      <a:r>
+                        <a:rPr lang="en-US" dirty="0" smtClean="0">
+                          <a:solidFill>
+                            <a:schemeClr val="tx1"/>
+                          </a:solidFill>
+                          <a:latin typeface="Lucida Console" pitchFamily="49" charset="0"/>
+                        </a:rPr>
+                        <a:t>W(&amp;h7)</a:t>
+                      </a:r>
+                      <a:endParaRPr lang="en-US" dirty="0">
+                        <a:solidFill>
+                          <a:schemeClr val="tx1"/>
+                        </a:solidFill>
+                        <a:latin typeface="Lucida Console" pitchFamily="49" charset="0"/>
+                      </a:endParaRPr>
+                    </a:p>
+                  </a:txBody>
+                  <a:tcPr>
+                    <a:lnL w="12700" cmpd="sng">
+                      <a:noFill/>
+                    </a:lnL>
+                    <a:lnR w="12700" cmpd="sng">
+                      <a:noFill/>
+                    </a:lnR>
+                    <a:lnT w="12700" cmpd="sng">
+                      <a:noFill/>
+                    </a:lnT>
+                    <a:lnB w="12700" cmpd="sng">
+                      <a:noFill/>
+                    </a:lnB>
+                    <a:lnTlToBr w="12700" cmpd="sng">
+                      <a:noFill/>
+                      <a:prstDash val="solid"/>
+                    </a:lnTlToBr>
+                    <a:lnBlToTr w="12700" cmpd="sng">
+                      <a:noFill/>
+                      <a:prstDash val="solid"/>
+                    </a:lnBlToTr>
+                    <a:solidFill>
+                      <a:schemeClr val="bg1"/>
+                    </a:solidFill>
+                  </a:tcPr>
+                </a:tc>
+                <a:tc>
+                  <a:txBody>
+                    <a:bodyPr/>
+                    <a:lstStyle/>
+                    <a:p>
+                      <a:endParaRPr lang="en-US" dirty="0">
+                        <a:solidFill>
+                          <a:schemeClr val="tx1"/>
+                        </a:solidFill>
+                        <a:latin typeface="Lucida Console" pitchFamily="49" charset="0"/>
+                      </a:endParaRPr>
+                    </a:p>
+                  </a:txBody>
+                  <a:tcPr>
+                    <a:lnL w="12700" cmpd="sng">
+                      <a:noFill/>
+                    </a:lnL>
+                    <a:lnR w="12700" cmpd="sng">
+                      <a:noFill/>
+                    </a:lnR>
+                    <a:lnT w="12700" cmpd="sng">
+                      <a:noFill/>
+                    </a:lnT>
+                    <a:lnB w="12700" cmpd="sng">
+                      <a:noFill/>
+                    </a:lnB>
+                    <a:lnTlToBr w="12700" cmpd="sng">
+                      <a:noFill/>
+                      <a:prstDash val="solid"/>
+                    </a:lnTlToBr>
+                    <a:lnBlToTr w="12700" cmpd="sng">
+                      <a:noFill/>
+                      <a:prstDash val="solid"/>
+                    </a:lnBlToTr>
+                    <a:solidFill>
+                      <a:schemeClr val="bg1"/>
+                    </a:solidFill>
+                  </a:tcPr>
+                </a:tc>
+              </a:tr>
+              <a:tr h="370840">
+                <a:tc>
+                  <a:txBody>
+                    <a:bodyPr/>
+                    <a:lstStyle/>
+                    <a:p>
+                      <a:pPr marL="0" marR="0" indent="0" algn="l" defTabSz="914400" rtl="0" eaLnBrk="1" fontAlgn="auto" latinLnBrk="0" hangingPunct="1">
+                        <a:lnSpc>
+                          <a:spcPct val="100000"/>
+                        </a:lnSpc>
+                        <a:spcBef>
+                          <a:spcPts val="0"/>
+                        </a:spcBef>
+                        <a:spcAft>
+                          <a:spcPts val="0"/>
+                        </a:spcAft>
+                        <a:buClrTx/>
+                        <a:buSzTx/>
+                        <a:buFontTx/>
+                        <a:buNone/>
+                        <a:tabLst/>
+                        <a:defRPr/>
+                      </a:pPr>
+                      <a:r>
+                        <a:rPr lang="en-US" dirty="0" smtClean="0">
+                          <a:solidFill>
+                            <a:schemeClr val="tx1"/>
+                          </a:solidFill>
+                          <a:latin typeface="Lucida Console" pitchFamily="49" charset="0"/>
+                        </a:rPr>
                         <a:t>R</a:t>
                       </a:r>
                       <a:r>
@@ -27577,7 +27627,44 @@
                           </a:solidFill>
                           <a:latin typeface="Lucida Console" pitchFamily="49" charset="0"/>
                         </a:rPr>
-                        <a:t>(*,c,&amp;h4)</a:t>
+                        <a:t>(*,c,&amp;h4</a:t>
+                      </a:r>
+                      <a:r>
+                        <a:rPr lang="en-US" dirty="0" smtClean="0">
+                          <a:solidFill>
+                            <a:schemeClr val="tx1"/>
+                          </a:solidFill>
+                          <a:latin typeface="Lucida Console" pitchFamily="49" charset="0"/>
+                        </a:rPr>
+                        <a:t>)</a:t>
+                      </a:r>
+                    </a:p>
+                    <a:p>
+                      <a:pPr marL="0" marR="0" indent="0" algn="l" defTabSz="914400" rtl="0" eaLnBrk="1" fontAlgn="auto" latinLnBrk="0" hangingPunct="1">
+                        <a:lnSpc>
+                          <a:spcPct val="100000"/>
+                        </a:lnSpc>
+                        <a:spcBef>
+                          <a:spcPts val="0"/>
+                        </a:spcBef>
+                        <a:spcAft>
+                          <a:spcPts val="0"/>
+                        </a:spcAft>
+                        <a:buClrTx/>
+                        <a:buSzTx/>
+                        <a:buFontTx/>
+                        <a:buNone/>
+                        <a:tabLst/>
+                        <a:defRPr/>
+                      </a:pPr>
+                      <a:r>
+                        <a:rPr lang="en-US" dirty="0" smtClean="0">
+                          <a:solidFill>
+                            <a:schemeClr val="tx1"/>
+                          </a:solidFill>
+                          <a:latin typeface="Lucida Console" pitchFamily="49" charset="0"/>
+                        </a:rPr>
+                        <a:t>W(&amp;h4)</a:t>
                       </a:r>
                       <a:endParaRPr lang="en-US" dirty="0">
                         <a:solidFill>
@@ -27709,7 +27796,7 @@
   <p:timing>
     <p:tnLst>
       <p:par>
-        <p:cTn xmlns:p14="http://schemas.microsoft.com/office/powerpoint/2010/main" id="1" dur="indefinite" restart="never" nodeType="tmRoot"/>
+        <p:cTn id="1" dur="indefinite" restart="never" nodeType="tmRoot"/>
       </p:par>
     </p:tnLst>
   </p:timing>
@@ -29312,18 +29399,18 @@
   <p:clrMapOvr>
     <a:masterClrMapping/>
   </p:clrMapOvr>
-  <mc:AlternateContent xmlns:mc="http://schemas.openxmlformats.org/markup-compatibility/2006">
-    <mc:Choice xmlns:p14="http://schemas.microsoft.com/office/powerpoint/2010/main" Requires="p14">
+  <mc:AlternateContent xmlns:mc="http://schemas.openxmlformats.org/markup-compatibility/2006" xmlns:p14="http://schemas.microsoft.com/office/powerpoint/2010/main">
+    <mc:Choice Requires="p14">
       <p:transition spd="slow" p14:dur="2000"/>
     </mc:Choice>
-    <mc:Fallback>
+    <mc:Fallback xmlns="">
       <p:transition xmlns:p14="http://schemas.microsoft.com/office/powerpoint/2010/main" spd="slow"/>
     </mc:Fallback>
   </mc:AlternateContent>
   <p:timing>
     <p:tnLst>
       <p:par>
-        <p:cTn xmlns:p14="http://schemas.microsoft.com/office/powerpoint/2010/main" id="1" dur="indefinite" restart="never" nodeType="tmRoot"/>
+        <p:cTn id="1" dur="indefinite" restart="never" nodeType="tmRoot"/>
       </p:par>
     </p:tnLst>
   </p:timing>
@@ -29356,14 +29443,14 @@
           <p:nvPr>
             <p:extLst>
               <p:ext uri="{D42A27DB-BD31-4B8C-83A1-F6EECF244321}">
-                <p14:modId xmlns:p14="http://schemas.microsoft.com/office/powerpoint/2010/main" val="1249103845"/>
+                <p14:modId xmlns:p14="http://schemas.microsoft.com/office/powerpoint/2010/main" val="10711112"/>
               </p:ext>
             </p:extLst>
           </p:nvPr>
         </p:nvGraphicFramePr>
         <p:xfrm>
           <a:off x="1524000" y="1651000"/>
-          <a:ext cx="6553200" cy="1849120"/>
+          <a:ext cx="6553200" cy="2926080"/>
         </p:xfrm>
         <a:graphic>
           <a:graphicData uri="http://schemas.openxmlformats.org/drawingml/2006/table">
@@ -29575,14 +29662,35 @@
                           </a:solidFill>
                           <a:latin typeface="Lucida Console" pitchFamily="49" charset="0"/>
                         </a:rPr>
-                        <a:t>(*,a,&amp;h1)</a:t>
+                        <a:t>(*,a,&amp;h1</a:t>
+                      </a:r>
+                      <a:r>
+                        <a:rPr lang="en-US" dirty="0" smtClean="0">
+                          <a:solidFill>
+                            <a:schemeClr val="accent2">
+                              <a:lumMod val="60000"/>
+                              <a:lumOff val="40000"/>
+                            </a:schemeClr>
+                          </a:solidFill>
+                          <a:latin typeface="Lucida Console" pitchFamily="49" charset="0"/>
+                        </a:rPr>
+                        <a:t>)</a:t>
+                      </a:r>
+                    </a:p>
+                    <a:p>
+                      <a:pPr algn="l"/>
+                      <a:r>
+                        <a:rPr lang="en-US" dirty="0" smtClean="0">
+                          <a:solidFill>
+                            <a:schemeClr val="tx1"/>
+                          </a:solidFill>
+                          <a:latin typeface="Lucida Console" pitchFamily="49" charset="0"/>
+                        </a:rPr>
+                        <a:t>W(&amp;h1)</a:t>
                       </a:r>
                       <a:endParaRPr lang="en-US" dirty="0">
                         <a:solidFill>
-                          <a:schemeClr val="accent2">
-                            <a:lumMod val="60000"/>
-                            <a:lumOff val="40000"/>
-                          </a:schemeClr>
+                          <a:schemeClr val="tx1"/>
                         </a:solidFill>
                         <a:latin typeface="Lucida Console" pitchFamily="49" charset="0"/>
                       </a:endParaRPr>
@@ -29653,14 +29761,34 @@
                           </a:solidFill>
                           <a:latin typeface="Lucida Console" pitchFamily="49" charset="0"/>
                         </a:rPr>
-                        <a:t>(0,”2”,&amp;h5)</a:t>
+                        <a:t>(0,”2”,&amp;h5</a:t>
+                      </a:r>
+                      <a:r>
+                        <a:rPr lang="en-US" dirty="0" smtClean="0">
+                          <a:solidFill>
+                            <a:schemeClr val="accent2">
+                              <a:lumMod val="60000"/>
+                              <a:lumOff val="40000"/>
+                            </a:schemeClr>
+                          </a:solidFill>
+                          <a:latin typeface="Lucida Console" pitchFamily="49" charset="0"/>
+                        </a:rPr>
+                        <a:t>)</a:t>
+                      </a:r>
+                    </a:p>
+                    <a:p>
+                      <a:r>
+                        <a:rPr lang="en-US" dirty="0" smtClean="0">
+                          <a:solidFill>
+                            <a:schemeClr val="tx1"/>
+                          </a:solidFill>
+                          <a:latin typeface="Lucida Console" pitchFamily="49" charset="0"/>
+                        </a:rPr>
+                        <a:t>W(&amp;h5)</a:t>
                       </a:r>
                       <a:endParaRPr lang="en-US" dirty="0">
                         <a:solidFill>
-                          <a:schemeClr val="accent2">
-                            <a:lumMod val="60000"/>
-                            <a:lumOff val="40000"/>
-                          </a:schemeClr>
+                          <a:schemeClr val="tx1"/>
                         </a:solidFill>
                         <a:latin typeface="Lucida Console" pitchFamily="49" charset="0"/>
                       </a:endParaRPr>
@@ -29731,14 +29859,34 @@
                           </a:solidFill>
                           <a:latin typeface="Lucida Console" pitchFamily="49" charset="0"/>
                         </a:rPr>
-                        <a:t>(0,”4”,&amp;h8)</a:t>
+                        <a:t>(0,”4”,&amp;h8</a:t>
+                      </a:r>
+                      <a:r>
+                        <a:rPr lang="en-US" dirty="0" smtClean="0">
+                          <a:solidFill>
+                            <a:schemeClr val="accent2">
+                              <a:lumMod val="60000"/>
+                              <a:lumOff val="40000"/>
+                            </a:schemeClr>
+                          </a:solidFill>
+                          <a:latin typeface="Lucida Console" pitchFamily="49" charset="0"/>
+                        </a:rPr>
+                        <a:t>)</a:t>
+                      </a:r>
+                    </a:p>
+                    <a:p>
+                      <a:r>
+                        <a:rPr lang="en-US" dirty="0" smtClean="0">
+                          <a:solidFill>
+                            <a:schemeClr val="tx1"/>
+                          </a:solidFill>
+                          <a:latin typeface="Lucida Console" pitchFamily="49" charset="0"/>
+                        </a:rPr>
+                        <a:t>W(&amp;h8)</a:t>
                       </a:r>
                       <a:endParaRPr lang="en-US" dirty="0">
                         <a:solidFill>
-                          <a:schemeClr val="accent2">
-                            <a:lumMod val="60000"/>
-                            <a:lumOff val="40000"/>
-                          </a:schemeClr>
+                          <a:schemeClr val="tx1"/>
                         </a:solidFill>
                         <a:latin typeface="Lucida Console" pitchFamily="49" charset="0"/>
                       </a:endParaRPr>
@@ -29828,49 +29976,21 @@
                           </a:solidFill>
                           <a:latin typeface="Lucida Console" pitchFamily="49" charset="0"/>
                         </a:rPr>
-                        <a:t>(*,b,&amp;h2)</a:t>
-                      </a:r>
-                      <a:endParaRPr lang="en-US" dirty="0">
-                        <a:solidFill>
-                          <a:schemeClr val="accent2">
-                            <a:lumMod val="60000"/>
-                            <a:lumOff val="40000"/>
-                          </a:schemeClr>
-                        </a:solidFill>
-                        <a:latin typeface="Lucida Console" pitchFamily="49" charset="0"/>
-                      </a:endParaRPr>
-                    </a:p>
-                  </a:txBody>
-                  <a:tcPr>
-                    <a:lnL w="12700" cmpd="sng">
-                      <a:noFill/>
-                    </a:lnL>
-                    <a:lnR w="12700" cmpd="sng">
-                      <a:noFill/>
-                    </a:lnR>
-                    <a:lnT w="12700" cmpd="sng">
-                      <a:noFill/>
-                    </a:lnT>
-                    <a:lnB w="12700" cmpd="sng">
-                      <a:noFill/>
-                    </a:lnB>
-                    <a:lnTlToBr w="12700" cmpd="sng">
-                      <a:noFill/>
-                      <a:prstDash val="solid"/>
-                    </a:lnTlToBr>
-                    <a:lnBlToTr w="12700" cmpd="sng">
-                      <a:noFill/>
-                      <a:prstDash val="solid"/>
-                    </a:lnBlToTr>
-                    <a:solidFill>
-                      <a:schemeClr val="bg1"/>
-                    </a:solidFill>
-                  </a:tcPr>
-                </a:tc>
-                <a:tc>
-                  <a:txBody>
-                    <a:bodyPr/>
-                    <a:lstStyle/>
+                        <a:t>(*,b,&amp;h2</a:t>
+                      </a:r>
+                      <a:r>
+                        <a:rPr lang="en-US" dirty="0" smtClean="0">
+                          <a:solidFill>
+                            <a:schemeClr val="accent2">
+                              <a:lumMod val="60000"/>
+                              <a:lumOff val="40000"/>
+                            </a:schemeClr>
+                          </a:solidFill>
+                          <a:latin typeface="Lucida Console" pitchFamily="49" charset="0"/>
+                        </a:rPr>
+                        <a:t>)</a:t>
+                      </a:r>
+                    </a:p>
                     <a:p>
                       <a:pPr marL="0" marR="0" indent="0" algn="l" defTabSz="914400" rtl="0" eaLnBrk="1" fontAlgn="auto" latinLnBrk="0" hangingPunct="1">
                         <a:lnSpc>
@@ -29892,45 +30012,15 @@
                       <a:r>
                         <a:rPr lang="en-US" dirty="0" smtClean="0">
                           <a:solidFill>
-                            <a:schemeClr val="accent1">
-                              <a:lumMod val="60000"/>
-                              <a:lumOff val="40000"/>
-                            </a:schemeClr>
-                          </a:solidFill>
-                          <a:latin typeface="Lucida Console" pitchFamily="49" charset="0"/>
-                        </a:rPr>
-                        <a:t>R</a:t>
-                      </a:r>
-                      <a:r>
-                        <a:rPr lang="en-US" baseline="-25000" dirty="0" smtClean="0">
-                          <a:solidFill>
-                            <a:schemeClr val="accent1">
-                              <a:lumMod val="60000"/>
-                              <a:lumOff val="40000"/>
-                            </a:schemeClr>
-                          </a:solidFill>
-                          <a:latin typeface="Lucida Console" pitchFamily="49" charset="0"/>
-                        </a:rPr>
-                        <a:t>1,2</a:t>
-                      </a:r>
-                      <a:r>
-                        <a:rPr lang="en-US" dirty="0" smtClean="0">
-                          <a:solidFill>
-                            <a:schemeClr val="accent1">
-                              <a:lumMod val="60000"/>
-                              <a:lumOff val="40000"/>
-                            </a:schemeClr>
-                          </a:solidFill>
-                          <a:latin typeface="Lucida Console" pitchFamily="49" charset="0"/>
-                        </a:rPr>
-                        <a:t>(*,d,&amp;h6)</a:t>
+                            <a:schemeClr val="tx1"/>
+                          </a:solidFill>
+                          <a:latin typeface="Lucida Console" pitchFamily="49" charset="0"/>
+                        </a:rPr>
+                        <a:t>W(&amp;h2)</a:t>
                       </a:r>
                       <a:endParaRPr lang="en-US" dirty="0">
                         <a:solidFill>
-                          <a:schemeClr val="accent1">
-                            <a:lumMod val="60000"/>
-                            <a:lumOff val="40000"/>
-                          </a:schemeClr>
+                          <a:schemeClr val="tx1"/>
                         </a:solidFill>
                         <a:latin typeface="Lucida Console" pitchFamily="49" charset="0"/>
                       </a:endParaRPr>
@@ -29962,47 +30052,6 @@
                     </a:solidFill>
                   </a:tcPr>
                 </a:tc>
-                <a:tc>
-                  <a:txBody>
-                    <a:bodyPr/>
-                    <a:lstStyle/>
-                    <a:p>
-                      <a:endParaRPr lang="en-US" dirty="0">
-                        <a:solidFill>
-                          <a:schemeClr val="tx1"/>
-                        </a:solidFill>
-                        <a:latin typeface="Lucida Console" pitchFamily="49" charset="0"/>
-                      </a:endParaRPr>
-                    </a:p>
-                  </a:txBody>
-                  <a:tcPr>
-                    <a:lnL w="12700" cmpd="sng">
-                      <a:noFill/>
-                    </a:lnL>
-                    <a:lnR w="12700" cmpd="sng">
-                      <a:noFill/>
-                    </a:lnR>
-                    <a:lnT w="12700" cmpd="sng">
-                      <a:noFill/>
-                    </a:lnT>
-                    <a:lnB w="12700" cmpd="sng">
-                      <a:noFill/>
-                    </a:lnB>
-                    <a:lnTlToBr w="12700" cmpd="sng">
-                      <a:noFill/>
-                      <a:prstDash val="solid"/>
-                    </a:lnTlToBr>
-                    <a:lnBlToTr w="12700" cmpd="sng">
-                      <a:noFill/>
-                      <a:prstDash val="solid"/>
-                    </a:lnBlToTr>
-                    <a:solidFill>
-                      <a:schemeClr val="bg1"/>
-                    </a:solidFill>
-                  </a:tcPr>
-                </a:tc>
-              </a:tr>
-              <a:tr h="370840">
                 <a:tc>
                   <a:txBody>
                     <a:bodyPr/>
@@ -30035,7 +30084,7 @@
                           </a:solidFill>
                           <a:latin typeface="Lucida Console" pitchFamily="49" charset="0"/>
                         </a:rPr>
-                        <a:t>S</a:t>
+                        <a:t>R</a:t>
                       </a:r>
                       <a:r>
                         <a:rPr lang="en-US" baseline="-25000" dirty="0" smtClean="0">
@@ -30047,7 +30096,7 @@
                           </a:solidFill>
                           <a:latin typeface="Lucida Console" pitchFamily="49" charset="0"/>
                         </a:rPr>
-                        <a:t>0,3</a:t>
+                        <a:t>1,2</a:t>
                       </a:r>
                       <a:r>
                         <a:rPr lang="en-US" dirty="0" smtClean="0">
@@ -30059,49 +30108,21 @@
                           </a:solidFill>
                           <a:latin typeface="Lucida Console" pitchFamily="49" charset="0"/>
                         </a:rPr>
-                        <a:t>(1,”1”,&amp;h3)</a:t>
-                      </a:r>
-                      <a:endParaRPr lang="en-US" dirty="0">
-                        <a:solidFill>
-                          <a:schemeClr val="accent1">
-                            <a:lumMod val="60000"/>
-                            <a:lumOff val="40000"/>
-                          </a:schemeClr>
-                        </a:solidFill>
-                        <a:latin typeface="Lucida Console" pitchFamily="49" charset="0"/>
-                      </a:endParaRPr>
-                    </a:p>
-                  </a:txBody>
-                  <a:tcPr>
-                    <a:lnL w="12700" cmpd="sng">
-                      <a:noFill/>
-                    </a:lnL>
-                    <a:lnR w="12700" cmpd="sng">
-                      <a:noFill/>
-                    </a:lnR>
-                    <a:lnT w="12700" cmpd="sng">
-                      <a:noFill/>
-                    </a:lnT>
-                    <a:lnB w="12700" cmpd="sng">
-                      <a:noFill/>
-                    </a:lnB>
-                    <a:lnTlToBr w="12700" cmpd="sng">
-                      <a:noFill/>
-                      <a:prstDash val="solid"/>
-                    </a:lnTlToBr>
-                    <a:lnBlToTr w="12700" cmpd="sng">
-                      <a:noFill/>
-                      <a:prstDash val="solid"/>
-                    </a:lnBlToTr>
-                    <a:solidFill>
-                      <a:schemeClr val="bg1"/>
-                    </a:solidFill>
-                  </a:tcPr>
-                </a:tc>
-                <a:tc>
-                  <a:txBody>
-                    <a:bodyPr/>
-                    <a:lstStyle/>
+                        <a:t>(*,d,&amp;h6</a:t>
+                      </a:r>
+                      <a:r>
+                        <a:rPr lang="en-US" dirty="0" smtClean="0">
+                          <a:solidFill>
+                            <a:schemeClr val="accent1">
+                              <a:lumMod val="60000"/>
+                              <a:lumOff val="40000"/>
+                            </a:schemeClr>
+                          </a:solidFill>
+                          <a:latin typeface="Lucida Console" pitchFamily="49" charset="0"/>
+                        </a:rPr>
+                        <a:t>)</a:t>
+                      </a:r>
+                    </a:p>
                     <a:p>
                       <a:pPr marL="0" marR="0" indent="0" algn="l" defTabSz="914400" rtl="0" eaLnBrk="1" fontAlgn="auto" latinLnBrk="0" hangingPunct="1">
                         <a:lnSpc>
@@ -30123,45 +30144,15 @@
                       <a:r>
                         <a:rPr lang="en-US" dirty="0" smtClean="0">
                           <a:solidFill>
-                            <a:schemeClr val="accent2">
-                              <a:lumMod val="60000"/>
-                              <a:lumOff val="40000"/>
-                            </a:schemeClr>
-                          </a:solidFill>
-                          <a:latin typeface="Lucida Console" pitchFamily="49" charset="0"/>
-                        </a:rPr>
-                        <a:t>S</a:t>
-                      </a:r>
-                      <a:r>
-                        <a:rPr lang="en-US" baseline="-25000" dirty="0" smtClean="0">
-                          <a:solidFill>
-                            <a:schemeClr val="accent2">
-                              <a:lumMod val="60000"/>
-                              <a:lumOff val="40000"/>
-                            </a:schemeClr>
-                          </a:solidFill>
-                          <a:latin typeface="Lucida Console" pitchFamily="49" charset="0"/>
-                        </a:rPr>
-                        <a:t>1,3</a:t>
-                      </a:r>
-                      <a:r>
-                        <a:rPr lang="en-US" dirty="0" smtClean="0">
-                          <a:solidFill>
-                            <a:schemeClr val="accent2">
-                              <a:lumMod val="60000"/>
-                              <a:lumOff val="40000"/>
-                            </a:schemeClr>
-                          </a:solidFill>
-                          <a:latin typeface="Lucida Console" pitchFamily="49" charset="0"/>
-                        </a:rPr>
-                        <a:t>(0,”3”,&amp;h7)</a:t>
+                            <a:schemeClr val="tx1"/>
+                          </a:solidFill>
+                          <a:latin typeface="Lucida Console" pitchFamily="49" charset="0"/>
+                        </a:rPr>
+                        <a:t>W(&amp;h6)</a:t>
                       </a:r>
                       <a:endParaRPr lang="en-US" dirty="0">
                         <a:solidFill>
-                          <a:schemeClr val="accent2">
-                            <a:lumMod val="60000"/>
-                            <a:lumOff val="40000"/>
-                          </a:schemeClr>
+                          <a:schemeClr val="tx1"/>
                         </a:solidFill>
                         <a:latin typeface="Lucida Console" pitchFamily="49" charset="0"/>
                       </a:endParaRPr>
@@ -30259,6 +30250,138 @@
                       <a:r>
                         <a:rPr lang="en-US" dirty="0" smtClean="0">
                           <a:solidFill>
+                            <a:schemeClr val="accent1">
+                              <a:lumMod val="60000"/>
+                              <a:lumOff val="40000"/>
+                            </a:schemeClr>
+                          </a:solidFill>
+                          <a:latin typeface="Lucida Console" pitchFamily="49" charset="0"/>
+                        </a:rPr>
+                        <a:t>S</a:t>
+                      </a:r>
+                      <a:r>
+                        <a:rPr lang="en-US" baseline="-25000" dirty="0" smtClean="0">
+                          <a:solidFill>
+                            <a:schemeClr val="accent1">
+                              <a:lumMod val="60000"/>
+                              <a:lumOff val="40000"/>
+                            </a:schemeClr>
+                          </a:solidFill>
+                          <a:latin typeface="Lucida Console" pitchFamily="49" charset="0"/>
+                        </a:rPr>
+                        <a:t>0,3</a:t>
+                      </a:r>
+                      <a:r>
+                        <a:rPr lang="en-US" dirty="0" smtClean="0">
+                          <a:solidFill>
+                            <a:schemeClr val="accent1">
+                              <a:lumMod val="60000"/>
+                              <a:lumOff val="40000"/>
+                            </a:schemeClr>
+                          </a:solidFill>
+                          <a:latin typeface="Lucida Console" pitchFamily="49" charset="0"/>
+                        </a:rPr>
+                        <a:t>(1,”1”,&amp;h3</a:t>
+                      </a:r>
+                      <a:r>
+                        <a:rPr lang="en-US" dirty="0" smtClean="0">
+                          <a:solidFill>
+                            <a:schemeClr val="accent1">
+                              <a:lumMod val="60000"/>
+                              <a:lumOff val="40000"/>
+                            </a:schemeClr>
+                          </a:solidFill>
+                          <a:latin typeface="Lucida Console" pitchFamily="49" charset="0"/>
+                        </a:rPr>
+                        <a:t>)</a:t>
+                      </a:r>
+                    </a:p>
+                    <a:p>
+                      <a:pPr marL="0" marR="0" indent="0" algn="l" defTabSz="914400" rtl="0" eaLnBrk="1" fontAlgn="auto" latinLnBrk="0" hangingPunct="1">
+                        <a:lnSpc>
+                          <a:spcPct val="100000"/>
+                        </a:lnSpc>
+                        <a:spcBef>
+                          <a:spcPts val="0"/>
+                        </a:spcBef>
+                        <a:spcAft>
+                          <a:spcPts val="0"/>
+                        </a:spcAft>
+                        <a:buClrTx/>
+                        <a:buSzTx/>
+                        <a:buFontTx/>
+                        <a:buNone/>
+                        <a:tabLst/>
+                        <a:defRPr/>
+                      </a:pPr>
+                      <a:r>
+                        <a:rPr lang="en-US" dirty="0" smtClean="0">
+                          <a:solidFill>
+                            <a:schemeClr val="tx1"/>
+                          </a:solidFill>
+                          <a:latin typeface="Lucida Console" pitchFamily="49" charset="0"/>
+                        </a:rPr>
+                        <a:t>W(&amp;h3)</a:t>
+                      </a:r>
+                      <a:endParaRPr lang="en-US" dirty="0">
+                        <a:solidFill>
+                          <a:schemeClr val="tx1"/>
+                        </a:solidFill>
+                        <a:latin typeface="Lucida Console" pitchFamily="49" charset="0"/>
+                      </a:endParaRPr>
+                    </a:p>
+                  </a:txBody>
+                  <a:tcPr>
+                    <a:lnL w="12700" cmpd="sng">
+                      <a:noFill/>
+                    </a:lnL>
+                    <a:lnR w="12700" cmpd="sng">
+                      <a:noFill/>
+                    </a:lnR>
+                    <a:lnT w="12700" cmpd="sng">
+                      <a:noFill/>
+                    </a:lnT>
+                    <a:lnB w="12700" cmpd="sng">
+                      <a:noFill/>
+                    </a:lnB>
+                    <a:lnTlToBr w="12700" cmpd="sng">
+                      <a:noFill/>
+                      <a:prstDash val="solid"/>
+                    </a:lnTlToBr>
+                    <a:lnBlToTr w="12700" cmpd="sng">
+                      <a:noFill/>
+                      <a:prstDash val="solid"/>
+                    </a:lnBlToTr>
+                    <a:solidFill>
+                      <a:schemeClr val="bg1"/>
+                    </a:solidFill>
+                  </a:tcPr>
+                </a:tc>
+                <a:tc>
+                  <a:txBody>
+                    <a:bodyPr/>
+                    <a:lstStyle/>
+                    <a:p>
+                      <a:pPr marL="0" marR="0" indent="0" algn="l" defTabSz="914400" rtl="0" eaLnBrk="1" fontAlgn="auto" latinLnBrk="0" hangingPunct="1">
+                        <a:lnSpc>
+                          <a:spcPct val="100000"/>
+                        </a:lnSpc>
+                        <a:spcBef>
+                          <a:spcPts val="0"/>
+                        </a:spcBef>
+                        <a:spcAft>
+                          <a:spcPts val="0"/>
+                        </a:spcAft>
+                        <a:buClrTx/>
+                        <a:buSzTx/>
+                        <a:buFontTx/>
+                        <a:buNone/>
+                        <a:tabLst/>
+                        <a:defRPr/>
+                      </a:pPr>
+                      <a:r>
+                        <a:rPr lang="en-US" dirty="0" smtClean="0">
+                          <a:solidFill>
                             <a:schemeClr val="accent2">
                               <a:lumMod val="60000"/>
                               <a:lumOff val="40000"/>
@@ -30266,7 +30389,7 @@
                           </a:solidFill>
                           <a:latin typeface="Lucida Console" pitchFamily="49" charset="0"/>
                         </a:rPr>
-                        <a:t>R</a:t>
+                        <a:t>S</a:t>
                       </a:r>
                       <a:r>
                         <a:rPr lang="en-US" baseline="-25000" dirty="0" smtClean="0">
@@ -30278,7 +30401,7 @@
                           </a:solidFill>
                           <a:latin typeface="Lucida Console" pitchFamily="49" charset="0"/>
                         </a:rPr>
-                        <a:t>0,4</a:t>
+                        <a:t>1,3</a:t>
                       </a:r>
                       <a:r>
                         <a:rPr lang="en-US" dirty="0" smtClean="0">
@@ -30290,14 +30413,224 @@
                           </a:solidFill>
                           <a:latin typeface="Lucida Console" pitchFamily="49" charset="0"/>
                         </a:rPr>
-                        <a:t>(*,c,&amp;h4)</a:t>
+                        <a:t>(0,”3”,&amp;h7</a:t>
+                      </a:r>
+                      <a:r>
+                        <a:rPr lang="en-US" dirty="0" smtClean="0">
+                          <a:solidFill>
+                            <a:schemeClr val="accent2">
+                              <a:lumMod val="60000"/>
+                              <a:lumOff val="40000"/>
+                            </a:schemeClr>
+                          </a:solidFill>
+                          <a:latin typeface="Lucida Console" pitchFamily="49" charset="0"/>
+                        </a:rPr>
+                        <a:t>)</a:t>
+                      </a:r>
+                    </a:p>
+                    <a:p>
+                      <a:pPr marL="0" marR="0" indent="0" algn="l" defTabSz="914400" rtl="0" eaLnBrk="1" fontAlgn="auto" latinLnBrk="0" hangingPunct="1">
+                        <a:lnSpc>
+                          <a:spcPct val="100000"/>
+                        </a:lnSpc>
+                        <a:spcBef>
+                          <a:spcPts val="0"/>
+                        </a:spcBef>
+                        <a:spcAft>
+                          <a:spcPts val="0"/>
+                        </a:spcAft>
+                        <a:buClrTx/>
+                        <a:buSzTx/>
+                        <a:buFontTx/>
+                        <a:buNone/>
+                        <a:tabLst/>
+                        <a:defRPr/>
+                      </a:pPr>
+                      <a:r>
+                        <a:rPr lang="en-US" dirty="0" smtClean="0">
+                          <a:solidFill>
+                            <a:schemeClr val="tx1"/>
+                          </a:solidFill>
+                          <a:latin typeface="Lucida Console" pitchFamily="49" charset="0"/>
+                        </a:rPr>
+                        <a:t>W(&amp;h7)</a:t>
                       </a:r>
                       <a:endParaRPr lang="en-US" dirty="0">
                         <a:solidFill>
-                          <a:schemeClr val="accent2">
-                            <a:lumMod val="60000"/>
-                            <a:lumOff val="40000"/>
-                          </a:schemeClr>
+                          <a:schemeClr val="tx1"/>
+                        </a:solidFill>
+                        <a:latin typeface="Lucida Console" pitchFamily="49" charset="0"/>
+                      </a:endParaRPr>
+                    </a:p>
+                  </a:txBody>
+                  <a:tcPr>
+                    <a:lnL w="12700" cmpd="sng">
+                      <a:noFill/>
+                    </a:lnL>
+                    <a:lnR w="12700" cmpd="sng">
+                      <a:noFill/>
+                    </a:lnR>
+                    <a:lnT w="12700" cmpd="sng">
+                      <a:noFill/>
+                    </a:lnT>
+                    <a:lnB w="12700" cmpd="sng">
+                      <a:noFill/>
+                    </a:lnB>
+                    <a:lnTlToBr w="12700" cmpd="sng">
+                      <a:noFill/>
+                      <a:prstDash val="solid"/>
+                    </a:lnTlToBr>
+                    <a:lnBlToTr w="12700" cmpd="sng">
+                      <a:noFill/>
+                      <a:prstDash val="solid"/>
+                    </a:lnBlToTr>
+                    <a:solidFill>
+                      <a:schemeClr val="bg1"/>
+                    </a:solidFill>
+                  </a:tcPr>
+                </a:tc>
+                <a:tc>
+                  <a:txBody>
+                    <a:bodyPr/>
+                    <a:lstStyle/>
+                    <a:p>
+                      <a:endParaRPr lang="en-US" dirty="0">
+                        <a:solidFill>
+                          <a:schemeClr val="tx1"/>
+                        </a:solidFill>
+                        <a:latin typeface="Lucida Console" pitchFamily="49" charset="0"/>
+                      </a:endParaRPr>
+                    </a:p>
+                  </a:txBody>
+                  <a:tcPr>
+                    <a:lnL w="12700" cmpd="sng">
+                      <a:noFill/>
+                    </a:lnL>
+                    <a:lnR w="12700" cmpd="sng">
+                      <a:noFill/>
+                    </a:lnR>
+                    <a:lnT w="12700" cmpd="sng">
+                      <a:noFill/>
+                    </a:lnT>
+                    <a:lnB w="12700" cmpd="sng">
+                      <a:noFill/>
+                    </a:lnB>
+                    <a:lnTlToBr w="12700" cmpd="sng">
+                      <a:noFill/>
+                      <a:prstDash val="solid"/>
+                    </a:lnTlToBr>
+                    <a:lnBlToTr w="12700" cmpd="sng">
+                      <a:noFill/>
+                      <a:prstDash val="solid"/>
+                    </a:lnBlToTr>
+                    <a:solidFill>
+                      <a:schemeClr val="bg1"/>
+                    </a:solidFill>
+                  </a:tcPr>
+                </a:tc>
+              </a:tr>
+              <a:tr h="370840">
+                <a:tc>
+                  <a:txBody>
+                    <a:bodyPr/>
+                    <a:lstStyle/>
+                    <a:p>
+                      <a:pPr marL="0" marR="0" indent="0" algn="l" defTabSz="914400" rtl="0" eaLnBrk="1" fontAlgn="auto" latinLnBrk="0" hangingPunct="1">
+                        <a:lnSpc>
+                          <a:spcPct val="100000"/>
+                        </a:lnSpc>
+                        <a:spcBef>
+                          <a:spcPts val="0"/>
+                        </a:spcBef>
+                        <a:spcAft>
+                          <a:spcPts val="0"/>
+                        </a:spcAft>
+                        <a:buClrTx/>
+                        <a:buSzTx/>
+                        <a:buFontTx/>
+                        <a:buNone/>
+                        <a:tabLst/>
+                        <a:defRPr/>
+                      </a:pPr>
+                      <a:r>
+                        <a:rPr lang="en-US" dirty="0" smtClean="0">
+                          <a:solidFill>
+                            <a:schemeClr val="accent2">
+                              <a:lumMod val="60000"/>
+                              <a:lumOff val="40000"/>
+                            </a:schemeClr>
+                          </a:solidFill>
+                          <a:latin typeface="Lucida Console" pitchFamily="49" charset="0"/>
+                        </a:rPr>
+                        <a:t>R</a:t>
+                      </a:r>
+                      <a:r>
+                        <a:rPr lang="en-US" baseline="-25000" dirty="0" smtClean="0">
+                          <a:solidFill>
+                            <a:schemeClr val="accent2">
+                              <a:lumMod val="60000"/>
+                              <a:lumOff val="40000"/>
+                            </a:schemeClr>
+                          </a:solidFill>
+                          <a:latin typeface="Lucida Console" pitchFamily="49" charset="0"/>
+                        </a:rPr>
+                        <a:t>0,4</a:t>
+                      </a:r>
+                      <a:r>
+                        <a:rPr lang="en-US" dirty="0" smtClean="0">
+                          <a:solidFill>
+                            <a:schemeClr val="accent2">
+                              <a:lumMod val="60000"/>
+                              <a:lumOff val="40000"/>
+                            </a:schemeClr>
+                          </a:solidFill>
+                          <a:latin typeface="Lucida Console" pitchFamily="49" charset="0"/>
+                        </a:rPr>
+                        <a:t>(*,c,&amp;h4</a:t>
+                      </a:r>
+                      <a:r>
+                        <a:rPr lang="en-US" dirty="0" smtClean="0">
+                          <a:solidFill>
+                            <a:schemeClr val="accent2">
+                              <a:lumMod val="60000"/>
+                              <a:lumOff val="40000"/>
+                            </a:schemeClr>
+                          </a:solidFill>
+                          <a:latin typeface="Lucida Console" pitchFamily="49" charset="0"/>
+                        </a:rPr>
+                        <a:t>)</a:t>
+                      </a:r>
+                    </a:p>
+                    <a:p>
+                      <a:pPr marL="0" marR="0" indent="0" algn="l" defTabSz="914400" rtl="0" eaLnBrk="1" fontAlgn="auto" latinLnBrk="0" hangingPunct="1">
+                        <a:lnSpc>
+                          <a:spcPct val="100000"/>
+                        </a:lnSpc>
+                        <a:spcBef>
+                          <a:spcPts val="0"/>
+                        </a:spcBef>
+                        <a:spcAft>
+                          <a:spcPts val="0"/>
+                        </a:spcAft>
+                        <a:buClrTx/>
+                        <a:buSzTx/>
+                        <a:buFontTx/>
+                        <a:buNone/>
+                        <a:tabLst/>
+                        <a:defRPr/>
+                      </a:pPr>
+                      <a:r>
+                        <a:rPr lang="en-US" dirty="0" smtClean="0">
+                          <a:solidFill>
+                            <a:schemeClr val="tx1"/>
+                          </a:solidFill>
+                          <a:latin typeface="Lucida Console" pitchFamily="49" charset="0"/>
+                        </a:rPr>
+                        <a:t>W(&amp;h4)</a:t>
+                      </a:r>
+                      <a:endParaRPr lang="en-US" dirty="0">
+                        <a:solidFill>
+                          <a:schemeClr val="tx1"/>
                         </a:solidFill>
                         <a:latin typeface="Lucida Console" pitchFamily="49" charset="0"/>
                       </a:endParaRPr>
@@ -30443,7 +30776,7 @@
         </p:nvSpPr>
         <p:spPr>
           <a:xfrm>
-            <a:off x="1219200" y="4224918"/>
+            <a:off x="1219200" y="4895671"/>
             <a:ext cx="7391400" cy="1200329"/>
           </a:xfrm>
           <a:prstGeom prst="rect">
@@ -30670,7 +31003,7 @@
         <p:spPr>
           <a:xfrm flipV="1">
             <a:off x="3276600" y="2247900"/>
-            <a:ext cx="533400" cy="342900"/>
+            <a:ext cx="533400" cy="419100"/>
           </a:xfrm>
           <a:prstGeom prst="line">
             <a:avLst/>
@@ -30705,8 +31038,8 @@
         </p:nvCxnSpPr>
         <p:spPr>
           <a:xfrm>
-            <a:off x="3352800" y="2667000"/>
-            <a:ext cx="457200" cy="257175"/>
+            <a:off x="3352800" y="2924175"/>
+            <a:ext cx="342900" cy="504825"/>
           </a:xfrm>
           <a:prstGeom prst="line">
             <a:avLst/>
@@ -30742,7 +31075,7 @@
         <p:spPr>
           <a:xfrm flipV="1">
             <a:off x="3352800" y="2247900"/>
-            <a:ext cx="2438400" cy="342900"/>
+            <a:ext cx="2438400" cy="547687"/>
           </a:xfrm>
           <a:prstGeom prst="line">
             <a:avLst/>
@@ -30777,8 +31110,8 @@
         </p:nvCxnSpPr>
         <p:spPr>
           <a:xfrm flipV="1">
-            <a:off x="3352800" y="2971800"/>
-            <a:ext cx="342900" cy="381000"/>
+            <a:off x="3276600" y="2247900"/>
+            <a:ext cx="457200" cy="1866900"/>
           </a:xfrm>
           <a:prstGeom prst="line">
             <a:avLst/>
@@ -30813,8 +31146,8 @@
         </p:nvCxnSpPr>
         <p:spPr>
           <a:xfrm flipV="1">
-            <a:off x="3352800" y="2419350"/>
-            <a:ext cx="2971800" cy="1009650"/>
+            <a:off x="3352800" y="2362200"/>
+            <a:ext cx="2438400" cy="1800226"/>
           </a:xfrm>
           <a:prstGeom prst="line">
             <a:avLst/>
@@ -30849,8 +31182,8 @@
         </p:nvCxnSpPr>
         <p:spPr>
           <a:xfrm flipV="1">
-            <a:off x="3352800" y="2667000"/>
-            <a:ext cx="609600" cy="304800"/>
+            <a:off x="3543300" y="2924175"/>
+            <a:ext cx="190500" cy="504825"/>
           </a:xfrm>
           <a:prstGeom prst="line">
             <a:avLst/>
@@ -30893,7 +31226,7 @@
   <p:timing>
     <p:tnLst>
       <p:par>
-        <p:cTn xmlns:p14="http://schemas.microsoft.com/office/powerpoint/2010/main" id="1" dur="indefinite" restart="never" nodeType="tmRoot"/>
+        <p:cTn id="1" dur="indefinite" restart="never" nodeType="tmRoot"/>
       </p:par>
     </p:tnLst>
   </p:timing>
@@ -30949,14 +31282,14 @@
           <p:nvPr>
             <p:extLst>
               <p:ext uri="{D42A27DB-BD31-4B8C-83A1-F6EECF244321}">
-                <p14:modId xmlns:p14="http://schemas.microsoft.com/office/powerpoint/2010/main" val="2587677395"/>
+                <p14:modId xmlns:p14="http://schemas.microsoft.com/office/powerpoint/2010/main" val="3768279552"/>
               </p:ext>
             </p:extLst>
           </p:nvPr>
         </p:nvGraphicFramePr>
         <p:xfrm>
-          <a:off x="990600" y="1676400"/>
-          <a:ext cx="7239000" cy="1290320"/>
+          <a:off x="990600" y="1773242"/>
+          <a:ext cx="7239000" cy="1524000"/>
         </p:xfrm>
         <a:graphic>
           <a:graphicData uri="http://schemas.openxmlformats.org/drawingml/2006/table">
@@ -30965,110 +31298,18 @@
                 <a:tableStyleId>{5C22544A-7EE6-4342-B048-85BDC9FD1C3A}</a:tableStyleId>
               </a:tblPr>
               <a:tblGrid>
-                <a:gridCol w="1447800"/>
-                <a:gridCol w="1447800"/>
-                <a:gridCol w="1295400"/>
-                <a:gridCol w="1600200"/>
-                <a:gridCol w="1447800"/>
+                <a:gridCol w="1910292"/>
+                <a:gridCol w="1910292"/>
+                <a:gridCol w="1709208"/>
+                <a:gridCol w="1709208"/>
               </a:tblGrid>
-              <a:tr h="370840">
+              <a:tr h="520861">
                 <a:tc>
                   <a:txBody>
                     <a:bodyPr/>
                     <a:lstStyle/>
                     <a:p>
-                      <a:endParaRPr lang="en-US" dirty="0"/>
-                    </a:p>
-                  </a:txBody>
-                  <a:tcPr marL="0" marR="0" marT="0" marB="0"/>
-                </a:tc>
-                <a:tc>
-                  <a:txBody>
-                    <a:bodyPr/>
-                    <a:lstStyle/>
-                    <a:p>
                       <a:pPr algn="ctr"/>
-                      <a:r>
-                        <a:rPr lang="en-US" dirty="0" smtClean="0"/>
-                        <a:t>Program Order</a:t>
-                      </a:r>
-                      <a:endParaRPr lang="en-US" dirty="0"/>
-                    </a:p>
-                  </a:txBody>
-                  <a:tcPr marL="0" marR="0" marT="0" marB="0"/>
-                </a:tc>
-                <a:tc>
-                  <a:txBody>
-                    <a:bodyPr/>
-                    <a:lstStyle/>
-                    <a:p>
-                      <a:pPr algn="ctr"/>
-                      <a:r>
-                        <a:rPr lang="en-US" dirty="0" smtClean="0"/>
-                        <a:t>Matches</a:t>
-                      </a:r>
-                      <a:endParaRPr lang="en-US" dirty="0"/>
-                    </a:p>
-                  </a:txBody>
-                  <a:tcPr marL="0" marR="0" marT="0" marB="0"/>
-                </a:tc>
-                <a:tc>
-                  <a:txBody>
-                    <a:bodyPr/>
-                    <a:lstStyle/>
-                    <a:p>
-                      <a:pPr algn="ctr"/>
-                      <a:r>
-                        <a:rPr lang="en-US" dirty="0" err="1" smtClean="0"/>
-                        <a:t>Assume&amp;Assert</a:t>
-                      </a:r>
-                      <a:endParaRPr lang="en-US" dirty="0"/>
-                    </a:p>
-                  </a:txBody>
-                  <a:tcPr marL="0" marR="0" marT="0" marB="0"/>
-                </a:tc>
-                <a:tc>
-                  <a:txBody>
-                    <a:bodyPr/>
-                    <a:lstStyle/>
-                    <a:p>
-                      <a:pPr algn="ctr"/>
-                      <a:r>
-                        <a:rPr lang="en-US" dirty="0" smtClean="0"/>
-                        <a:t>Extra</a:t>
-                      </a:r>
-                      <a:endParaRPr lang="en-US" dirty="0"/>
-                    </a:p>
-                  </a:txBody>
-                  <a:tcPr marL="0" marR="0" marT="0" marB="0"/>
-                </a:tc>
-              </a:tr>
-              <a:tr h="370840">
-                <a:tc>
-                  <a:txBody>
-                    <a:bodyPr/>
-                    <a:lstStyle/>
-                    <a:p>
-                      <a:pPr algn="ctr"/>
-                      <a:r>
-                        <a:rPr lang="en-US" dirty="0" smtClean="0"/>
-                        <a:t>Our Encoding</a:t>
-                      </a:r>
-                      <a:endParaRPr lang="en-US" dirty="0"/>
-                    </a:p>
-                  </a:txBody>
-                  <a:tcPr marL="0" marR="0" marT="0" marB="0"/>
-                </a:tc>
-                <a:tc>
-                  <a:txBody>
-                    <a:bodyPr/>
-                    <a:lstStyle/>
-                    <a:p>
-                      <a:pPr algn="ctr"/>
-                      <a:r>
-                        <a:rPr lang="en-US" dirty="0" smtClean="0"/>
-                        <a:t>11</a:t>
-                      </a:r>
                       <a:endParaRPr lang="en-US" dirty="0"/>
                     </a:p>
                   </a:txBody>
@@ -31082,7 +31323,7 @@
                       <a:pPr algn="ctr"/>
                       <a:r>
                         <a:rPr lang="en-US" dirty="0" smtClean="0"/>
-                        <a:t>4</a:t>
+                        <a:t>Definitions</a:t>
                       </a:r>
                       <a:endParaRPr lang="en-US" dirty="0"/>
                     </a:p>
@@ -31097,7 +31338,7 @@
                       <a:pPr algn="ctr"/>
                       <a:r>
                         <a:rPr lang="en-US" dirty="0" smtClean="0"/>
-                        <a:t>2</a:t>
+                        <a:t>Constraints</a:t>
                       </a:r>
                       <a:endParaRPr lang="en-US" dirty="0"/>
                     </a:p>
@@ -31109,18 +31350,33 @@
                     <a:bodyPr/>
                     <a:lstStyle/>
                     <a:p>
-                      <a:pPr algn="ctr"/>
+                      <a:pPr marL="0" marR="0" indent="0" algn="ctr" defTabSz="914400" rtl="0" eaLnBrk="1" fontAlgn="auto" latinLnBrk="0" hangingPunct="1">
+                        <a:lnSpc>
+                          <a:spcPct val="100000"/>
+                        </a:lnSpc>
+                        <a:spcBef>
+                          <a:spcPts val="0"/>
+                        </a:spcBef>
+                        <a:spcAft>
+                          <a:spcPts val="0"/>
+                        </a:spcAft>
+                        <a:buClrTx/>
+                        <a:buSzTx/>
+                        <a:buFontTx/>
+                        <a:buNone/>
+                        <a:tabLst/>
+                        <a:defRPr/>
+                      </a:pPr>
                       <a:r>
                         <a:rPr lang="en-US" dirty="0" smtClean="0"/>
-                        <a:t>0</a:t>
-                      </a:r>
-                      <a:endParaRPr lang="en-US" dirty="0"/>
+                        <a:t>Matches</a:t>
+                      </a:r>
                     </a:p>
                   </a:txBody>
                   <a:tcPr marL="0" marR="0" marT="0" marB="0" anchor="ctr"/>
                 </a:tc>
               </a:tr>
-              <a:tr h="370840">
+              <a:tr h="520861">
                 <a:tc>
                   <a:txBody>
                     <a:bodyPr/>
@@ -31128,27 +31384,8 @@
                     <a:p>
                       <a:pPr algn="ctr"/>
                       <a:r>
-                        <a:rPr lang="en-US" dirty="0" err="1" smtClean="0"/>
-                        <a:t>Elwakil’s</a:t>
-                      </a:r>
-                      <a:r>
                         <a:rPr lang="en-US" dirty="0" smtClean="0"/>
-                        <a:t> Encoding</a:t>
-                      </a:r>
-                      <a:endParaRPr lang="en-US" dirty="0"/>
-                    </a:p>
-                  </a:txBody>
-                  <a:tcPr marL="0" marR="0" marT="0" marB="0"/>
-                </a:tc>
-                <a:tc>
-                  <a:txBody>
-                    <a:bodyPr/>
-                    <a:lstStyle/>
-                    <a:p>
-                      <a:pPr algn="ctr"/>
-                      <a:r>
-                        <a:rPr lang="en-US" dirty="0" smtClean="0"/>
-                        <a:t>22</a:t>
+                        <a:t>Our Encoding</a:t>
                       </a:r>
                       <a:endParaRPr lang="en-US" dirty="0"/>
                     </a:p>
@@ -31163,7 +31400,7 @@
                       <a:pPr algn="ctr"/>
                       <a:r>
                         <a:rPr lang="en-US" dirty="0" smtClean="0"/>
-                        <a:t>13</a:t>
+                        <a:t>23</a:t>
                       </a:r>
                       <a:endParaRPr lang="en-US" dirty="0"/>
                     </a:p>
@@ -31178,7 +31415,7 @@
                       <a:pPr algn="ctr"/>
                       <a:r>
                         <a:rPr lang="en-US" dirty="0" smtClean="0"/>
-                        <a:t>3</a:t>
+                        <a:t>13</a:t>
                       </a:r>
                       <a:endParaRPr lang="en-US" dirty="0"/>
                     </a:p>
@@ -31190,10 +31427,91 @@
                     <a:bodyPr/>
                     <a:lstStyle/>
                     <a:p>
+                      <a:pPr marL="0" marR="0" indent="0" algn="ctr" defTabSz="914400" rtl="0" eaLnBrk="1" fontAlgn="auto" latinLnBrk="0" hangingPunct="1">
+                        <a:lnSpc>
+                          <a:spcPct val="100000"/>
+                        </a:lnSpc>
+                        <a:spcBef>
+                          <a:spcPts val="0"/>
+                        </a:spcBef>
+                        <a:spcAft>
+                          <a:spcPts val="0"/>
+                        </a:spcAft>
+                        <a:buClrTx/>
+                        <a:buSzTx/>
+                        <a:buFontTx/>
+                        <a:buNone/>
+                        <a:tabLst/>
+                        <a:defRPr/>
+                      </a:pPr>
+                      <a:r>
+                        <a:rPr lang="en-US" dirty="0" smtClean="0"/>
+                        <a:t>4</a:t>
+                      </a:r>
+                    </a:p>
+                  </a:txBody>
+                  <a:tcPr marL="0" marR="0" marT="0" marB="0" anchor="ctr"/>
+                </a:tc>
+              </a:tr>
+              <a:tr h="482278">
+                <a:tc>
+                  <a:txBody>
+                    <a:bodyPr/>
+                    <a:lstStyle/>
+                    <a:p>
                       <a:pPr algn="ctr"/>
                       <a:r>
+                        <a:rPr lang="en-US" dirty="0" err="1" smtClean="0"/>
+                        <a:t>Elwakil’s</a:t>
+                      </a:r>
+                      <a:r>
                         <a:rPr lang="en-US" dirty="0" smtClean="0"/>
-                        <a:t>8</a:t>
+                        <a:t> Encoding</a:t>
+                      </a:r>
+                      <a:endParaRPr lang="en-US" dirty="0"/>
+                    </a:p>
+                  </a:txBody>
+                  <a:tcPr marL="0" marR="0" marT="0" marB="0" anchor="ctr"/>
+                </a:tc>
+                <a:tc>
+                  <a:txBody>
+                    <a:bodyPr/>
+                    <a:lstStyle/>
+                    <a:p>
+                      <a:pPr algn="ctr"/>
+                      <a:r>
+                        <a:rPr lang="en-US" dirty="0" smtClean="0"/>
+                        <a:t>23</a:t>
+                      </a:r>
+                      <a:endParaRPr lang="en-US" dirty="0"/>
+                    </a:p>
+                  </a:txBody>
+                  <a:tcPr marL="0" marR="0" marT="0" marB="0" anchor="ctr"/>
+                </a:tc>
+                <a:tc>
+                  <a:txBody>
+                    <a:bodyPr/>
+                    <a:lstStyle/>
+                    <a:p>
+                      <a:pPr algn="ctr"/>
+                      <a:r>
+                        <a:rPr lang="en-US" dirty="0" smtClean="0"/>
+                        <a:t>33</a:t>
+                      </a:r>
+                      <a:endParaRPr lang="en-US" dirty="0"/>
+                    </a:p>
+                  </a:txBody>
+                  <a:tcPr marL="0" marR="0" marT="0" marB="0" anchor="ctr"/>
+                </a:tc>
+                <a:tc>
+                  <a:txBody>
+                    <a:bodyPr/>
+                    <a:lstStyle/>
+                    <a:p>
+                      <a:pPr algn="ctr"/>
+                      <a:r>
+                        <a:rPr lang="en-US" dirty="0" smtClean="0"/>
+                        <a:t>13</a:t>
                       </a:r>
                       <a:endParaRPr lang="en-US" dirty="0"/>
                     </a:p>
@@ -31722,7 +32040,7 @@
   <p:timing>
     <p:tnLst>
       <p:par>
-        <p:cTn xmlns:p14="http://schemas.microsoft.com/office/powerpoint/2010/main" id="1" dur="indefinite" restart="never" nodeType="tmRoot"/>
+        <p:cTn id="1" dur="indefinite" restart="never" nodeType="tmRoot"/>
       </p:par>
     </p:tnLst>
   </p:timing>
@@ -32107,8 +32425,10 @@
                           <a:latin typeface="Lucida Console" pitchFamily="49" charset="0"/>
                           <a:cs typeface="Times New Roman" pitchFamily="18" charset="0"/>
                         </a:rPr>
-                        <a:t> if(b &gt; 0</a:t>
-                      </a:r>
+                        <a:t> if(b &gt; 0)</a:t>
+                      </a:r>
+                    </a:p>
+                    <a:p>
                       <a:r>
                         <a:rPr lang="en-US" b="0" baseline="0" dirty="0" smtClean="0">
                           <a:solidFill>
@@ -32117,46 +32437,7 @@
                           <a:latin typeface="Lucida Console" pitchFamily="49" charset="0"/>
                           <a:cs typeface="Times New Roman" pitchFamily="18" charset="0"/>
                         </a:rPr>
-                        <a:t>)</a:t>
-                      </a:r>
-                      <a:endParaRPr lang="en-US" b="0" baseline="0" dirty="0" smtClean="0">
-                        <a:solidFill>
-                          <a:schemeClr val="tx1"/>
-                        </a:solidFill>
-                        <a:latin typeface="Lucida Console" pitchFamily="49" charset="0"/>
-                        <a:cs typeface="Times New Roman" pitchFamily="18" charset="0"/>
-                      </a:endParaRPr>
-                    </a:p>
-                    <a:p>
-                      <a:r>
-                        <a:rPr lang="en-US" b="0" baseline="0" dirty="0" smtClean="0">
-                          <a:solidFill>
-                            <a:schemeClr val="tx1"/>
-                          </a:solidFill>
-                          <a:latin typeface="Lucida Console" pitchFamily="49" charset="0"/>
-                          <a:cs typeface="Times New Roman" pitchFamily="18" charset="0"/>
-                        </a:rPr>
-                        <a:t> 09 </a:t>
-                      </a:r>
-                      <a:r>
-                        <a:rPr lang="en-US" b="0" baseline="0" dirty="0" smtClean="0">
-                          <a:solidFill>
-                            <a:schemeClr val="tx1"/>
-                          </a:solidFill>
-                          <a:latin typeface="Lucida Console" pitchFamily="49" charset="0"/>
-                          <a:cs typeface="Times New Roman" pitchFamily="18" charset="0"/>
-                        </a:rPr>
-                        <a:t>  assert</a:t>
-                      </a:r>
-                      <a:r>
-                        <a:rPr lang="en-US" b="0" baseline="0" dirty="0" smtClean="0">
-                          <a:solidFill>
-                            <a:schemeClr val="tx1"/>
-                          </a:solidFill>
-                          <a:latin typeface="Lucida Console" pitchFamily="49" charset="0"/>
-                          <a:cs typeface="Times New Roman" pitchFamily="18" charset="0"/>
-                        </a:rPr>
-                        <a:t>(a == 4);</a:t>
+                        <a:t> 09   assert(a == 4);</a:t>
                       </a:r>
                     </a:p>
                     <a:p>
@@ -32666,7 +32947,7 @@
   <p:timing>
     <p:tnLst>
       <p:par>
-        <p:cTn xmlns:p14="http://schemas.microsoft.com/office/powerpoint/2010/main" id="1" dur="indefinite" restart="never" nodeType="tmRoot"/>
+        <p:cTn id="1" dur="indefinite" restart="never" nodeType="tmRoot"/>
       </p:par>
     </p:tnLst>
   </p:timing>
@@ -32713,928 +32994,481 @@
           </a:p>
         </p:txBody>
       </p:sp>
-      <mc:AlternateContent xmlns:mc="http://schemas.openxmlformats.org/markup-compatibility/2006" xmlns:a14="http://schemas.microsoft.com/office/drawing/2010/main">
-        <mc:Choice Requires="a14">
-          <p:graphicFrame>
-            <p:nvGraphicFramePr>
-              <p:cNvPr id="3" name="Table 2"/>
-              <p:cNvGraphicFramePr>
-                <a:graphicFrameLocks noGrp="1"/>
-              </p:cNvGraphicFramePr>
-              <p:nvPr>
-                <p:extLst>
-                  <p:ext uri="{D42A27DB-BD31-4B8C-83A1-F6EECF244321}">
-                    <p14:modId xmlns:p14="http://schemas.microsoft.com/office/powerpoint/2010/main" val="3316487501"/>
-                  </p:ext>
-                </p:extLst>
-              </p:nvPr>
-            </p:nvGraphicFramePr>
-            <p:xfrm>
-              <a:off x="990600" y="2514600"/>
-              <a:ext cx="7162800" cy="2113279"/>
-            </p:xfrm>
-            <a:graphic>
-              <a:graphicData uri="http://schemas.openxmlformats.org/drawingml/2006/table">
-                <a:tbl>
-                  <a:tblPr firstRow="1" bandRow="1">
-                    <a:tableStyleId>{5C22544A-7EE6-4342-B048-85BDC9FD1C3A}</a:tableStyleId>
-                  </a:tblPr>
-                  <a:tblGrid>
-                    <a:gridCol w="1193800"/>
-                    <a:gridCol w="1193800"/>
-                    <a:gridCol w="1117600"/>
-                    <a:gridCol w="1295400"/>
-                    <a:gridCol w="1066800"/>
-                    <a:gridCol w="1295400"/>
-                  </a:tblGrid>
-                  <a:tr h="370840">
-                    <a:tc gridSpan="2">
-                      <a:txBody>
-                        <a:bodyPr/>
-                        <a:lstStyle/>
-                        <a:p>
-                          <a:pPr algn="ctr"/>
-                          <a:r>
-                            <a:rPr lang="en-US" dirty="0" smtClean="0"/>
-                            <a:t>Test Programs</a:t>
-                          </a:r>
-                          <a:endParaRPr lang="en-US" dirty="0"/>
-                        </a:p>
-                      </a:txBody>
-                      <a:tcPr marL="0" marR="0" marT="0" marB="0"/>
-                    </a:tc>
-                    <a:tc hMerge="1">
-                      <a:txBody>
-                        <a:bodyPr/>
-                        <a:lstStyle/>
-                        <a:p>
-                          <a:endParaRPr lang="en-US"/>
-                        </a:p>
-                      </a:txBody>
-                      <a:tcPr/>
-                    </a:tc>
-                    <a:tc gridSpan="2">
-                      <a:txBody>
-                        <a:bodyPr/>
-                        <a:lstStyle/>
-                        <a:p>
-                          <a:pPr algn="ctr"/>
-                          <a:r>
-                            <a:rPr lang="en-US" dirty="0" smtClean="0"/>
-                            <a:t>Our Encoding</a:t>
-                          </a:r>
-                          <a:endParaRPr lang="en-US" dirty="0"/>
-                        </a:p>
-                      </a:txBody>
-                      <a:tcPr marL="0" marR="0" marT="0" marB="0"/>
-                    </a:tc>
-                    <a:tc hMerge="1">
-                      <a:txBody>
-                        <a:bodyPr/>
-                        <a:lstStyle/>
-                        <a:p>
-                          <a:endParaRPr lang="en-US"/>
-                        </a:p>
-                      </a:txBody>
-                      <a:tcPr/>
-                    </a:tc>
-                    <a:tc gridSpan="2">
-                      <a:txBody>
-                        <a:bodyPr/>
-                        <a:lstStyle/>
-                        <a:p>
-                          <a:pPr algn="ctr"/>
-                          <a:r>
-                            <a:rPr lang="en-US" dirty="0" err="1" smtClean="0"/>
-                            <a:t>Elwakil’s</a:t>
-                          </a:r>
-                          <a:r>
-                            <a:rPr lang="en-US" dirty="0" smtClean="0"/>
-                            <a:t> Encoding</a:t>
-                          </a:r>
-                          <a:endParaRPr lang="en-US" dirty="0"/>
-                        </a:p>
-                      </a:txBody>
-                      <a:tcPr marL="0" marR="0" marT="0" marB="0"/>
-                    </a:tc>
-                    <a:tc hMerge="1">
-                      <a:txBody>
-                        <a:bodyPr/>
-                        <a:lstStyle/>
-                        <a:p>
-                          <a:endParaRPr lang="en-US"/>
-                        </a:p>
-                      </a:txBody>
-                      <a:tcPr/>
-                    </a:tc>
-                  </a:tr>
-                  <a:tr h="370840">
-                    <a:tc>
-                      <a:txBody>
-                        <a:bodyPr/>
-                        <a:lstStyle/>
-                        <a:p>
-                          <a:pPr algn="ctr"/>
-                          <a:r>
-                            <a:rPr lang="en-US" dirty="0" smtClean="0"/>
-                            <a:t>Name</a:t>
-                          </a:r>
-                          <a:endParaRPr lang="en-US" dirty="0"/>
-                        </a:p>
-                      </a:txBody>
-                      <a:tcPr marL="0" marR="0" marT="0" marB="0"/>
-                    </a:tc>
-                    <a:tc>
-                      <a:txBody>
-                        <a:bodyPr/>
-                        <a:lstStyle/>
-                        <a:p>
-                          <a:pPr algn="ctr"/>
-                          <a:r>
-                            <a:rPr lang="en-US" dirty="0" smtClean="0"/>
-                            <a:t>#</a:t>
-                          </a:r>
-                          <a:r>
-                            <a:rPr lang="en-US" dirty="0" err="1" smtClean="0"/>
-                            <a:t>Msg</a:t>
-                          </a:r>
-                          <a:endParaRPr lang="en-US" dirty="0"/>
-                        </a:p>
-                      </a:txBody>
-                      <a:tcPr marL="0" marR="0" marT="0" marB="0"/>
-                    </a:tc>
-                    <a:tc>
-                      <a:txBody>
-                        <a:bodyPr/>
-                        <a:lstStyle/>
-                        <a:p>
-                          <a:pPr algn="ctr"/>
-                          <a:r>
-                            <a:rPr lang="en-US" dirty="0" smtClean="0"/>
-                            <a:t>Time(</a:t>
-                          </a:r>
-                          <a:r>
-                            <a:rPr lang="en-US" dirty="0" err="1" smtClean="0"/>
-                            <a:t>ms</a:t>
-                          </a:r>
-                          <a:r>
-                            <a:rPr lang="en-US" dirty="0" smtClean="0"/>
-                            <a:t>)</a:t>
-                          </a:r>
-                          <a:endParaRPr lang="en-US" dirty="0"/>
-                        </a:p>
-                      </a:txBody>
-                      <a:tcPr marL="0" marR="0" marT="0" marB="0"/>
-                    </a:tc>
-                    <a:tc>
-                      <a:txBody>
-                        <a:bodyPr/>
-                        <a:lstStyle/>
-                        <a:p>
-                          <a:pPr algn="ctr"/>
-                          <a:r>
-                            <a:rPr lang="en-US" dirty="0" smtClean="0"/>
-                            <a:t>Memory(MB)</a:t>
-                          </a:r>
-                          <a:endParaRPr lang="en-US" dirty="0"/>
-                        </a:p>
-                      </a:txBody>
-                      <a:tcPr marL="0" marR="0" marT="0" marB="0"/>
-                    </a:tc>
-                    <a:tc>
-                      <a:txBody>
-                        <a:bodyPr/>
-                        <a:lstStyle/>
-                        <a:p>
-                          <a:pPr algn="ctr"/>
-                          <a:r>
-                            <a:rPr lang="en-US" dirty="0" smtClean="0"/>
-                            <a:t>Time(</a:t>
-                          </a:r>
-                          <a:r>
-                            <a:rPr lang="en-US" dirty="0" err="1" smtClean="0"/>
-                            <a:t>ms</a:t>
-                          </a:r>
-                          <a:r>
-                            <a:rPr lang="en-US" dirty="0" smtClean="0"/>
-                            <a:t>)</a:t>
-                          </a:r>
-                          <a:endParaRPr lang="en-US" dirty="0"/>
-                        </a:p>
-                      </a:txBody>
-                      <a:tcPr marL="0" marR="0" marT="0" marB="0"/>
-                    </a:tc>
-                    <a:tc>
-                      <a:txBody>
-                        <a:bodyPr/>
-                        <a:lstStyle/>
-                        <a:p>
-                          <a:pPr algn="ctr"/>
-                          <a:r>
-                            <a:rPr lang="en-US" dirty="0" smtClean="0"/>
-                            <a:t>Memory(MB)</a:t>
-                          </a:r>
-                          <a:endParaRPr lang="en-US" dirty="0"/>
-                        </a:p>
-                      </a:txBody>
-                      <a:tcPr marL="0" marR="0" marT="0" marB="0"/>
-                    </a:tc>
-                  </a:tr>
-                  <a:tr h="370840">
-                    <a:tc>
-                      <a:txBody>
-                        <a:bodyPr/>
-                        <a:lstStyle/>
-                        <a:p>
-                          <a:pPr algn="ctr"/>
-                          <a:r>
-                            <a:rPr lang="en-US" dirty="0" smtClean="0"/>
-                            <a:t>Leader</a:t>
-                          </a:r>
-                        </a:p>
-                        <a:p>
-                          <a:pPr algn="ctr"/>
-                          <a:r>
-                            <a:rPr lang="en-US" dirty="0" smtClean="0"/>
-                            <a:t>5ites</a:t>
-                          </a:r>
-                        </a:p>
-                        <a:p>
-                          <a:pPr algn="ctr"/>
-                          <a:r>
-                            <a:rPr lang="en-US" dirty="0" smtClean="0"/>
-                            <a:t>6ites</a:t>
-                          </a:r>
-                        </a:p>
-                        <a:p>
-                          <a:pPr algn="ctr"/>
-                          <a:r>
-                            <a:rPr lang="en-US" dirty="0" smtClean="0"/>
-                            <a:t>7ites</a:t>
-                          </a:r>
-                        </a:p>
-                        <a:p>
-                          <a:pPr algn="ctr"/>
-                          <a:r>
-                            <a:rPr lang="en-US" dirty="0" smtClean="0"/>
-                            <a:t>8ites</a:t>
-                          </a:r>
-                          <a:endParaRPr lang="en-US" dirty="0"/>
-                        </a:p>
-                      </a:txBody>
-                      <a:tcPr marL="0" marR="0" marT="0" marB="0"/>
-                    </a:tc>
-                    <a:tc>
-                      <a:txBody>
-                        <a:bodyPr/>
-                        <a:lstStyle/>
-                        <a:p>
-                          <a:pPr algn="ctr"/>
-                          <a:r>
-                            <a:rPr lang="en-US" dirty="0" smtClean="0"/>
-                            <a:t>30</a:t>
-                          </a:r>
-                        </a:p>
-                        <a:p>
-                          <a:pPr algn="ctr"/>
-                          <a:r>
-                            <a:rPr lang="en-US" dirty="0" smtClean="0"/>
-                            <a:t>15</a:t>
-                          </a:r>
-                        </a:p>
-                        <a:p>
-                          <a:pPr algn="ctr"/>
-                          <a:r>
-                            <a:rPr lang="en-US" dirty="0" smtClean="0"/>
-                            <a:t>18</a:t>
-                          </a:r>
-                        </a:p>
-                        <a:p>
-                          <a:pPr algn="ctr"/>
-                          <a:r>
-                            <a:rPr lang="en-US" dirty="0" smtClean="0"/>
-                            <a:t>21</a:t>
-                          </a:r>
-                        </a:p>
-                        <a:p>
-                          <a:pPr algn="ctr"/>
-                          <a:r>
-                            <a:rPr lang="en-US" dirty="0" smtClean="0"/>
-                            <a:t>24</a:t>
-                          </a:r>
-                          <a:endParaRPr lang="en-US" dirty="0"/>
-                        </a:p>
-                      </a:txBody>
-                      <a:tcPr marL="0" marR="0" marT="0" marB="0"/>
-                    </a:tc>
-                    <a:tc>
-                      <a:txBody>
-                        <a:bodyPr/>
-                        <a:lstStyle/>
-                        <a:p>
-                          <a:pPr algn="ctr"/>
-                          <a:r>
-                            <a:rPr lang="en-US" dirty="0" smtClean="0"/>
-                            <a:t>120</a:t>
-                          </a:r>
-                        </a:p>
-                        <a:p>
-                          <a:pPr algn="ctr"/>
-                          <a:r>
-                            <a:rPr lang="en-US" dirty="0" smtClean="0"/>
-                            <a:t>72</a:t>
-                          </a:r>
-                        </a:p>
-                        <a:p>
-                          <a:pPr algn="ctr"/>
-                          <a:r>
-                            <a:rPr lang="en-US" dirty="0" smtClean="0"/>
-                            <a:t>72</a:t>
-                          </a:r>
-                        </a:p>
-                        <a:p>
-                          <a:pPr algn="ctr"/>
-                          <a:r>
-                            <a:rPr lang="en-US" dirty="0" smtClean="0"/>
-                            <a:t>80</a:t>
-                          </a:r>
-                        </a:p>
-                        <a:p>
-                          <a:pPr algn="ctr"/>
-                          <a:r>
-                            <a:rPr lang="en-US" dirty="0" smtClean="0"/>
-                            <a:t>96</a:t>
-                          </a:r>
-                          <a:endParaRPr lang="en-US" dirty="0"/>
-                        </a:p>
-                      </a:txBody>
-                      <a:tcPr marL="0" marR="0" marT="0" marB="0"/>
-                    </a:tc>
-                    <a:tc>
-                      <a:txBody>
-                        <a:bodyPr/>
-                        <a:lstStyle/>
-                        <a:p>
-                          <a:pPr algn="ctr"/>
-                          <a:r>
-                            <a:rPr lang="en-US" dirty="0" smtClean="0"/>
-                            <a:t>25.473</a:t>
-                          </a:r>
-                        </a:p>
-                        <a:p>
-                          <a:pPr algn="ctr"/>
-                          <a:r>
-                            <a:rPr lang="en-US" dirty="0" smtClean="0"/>
-                            <a:t>18.519</a:t>
-                          </a:r>
-                        </a:p>
-                        <a:p>
-                          <a:pPr algn="ctr"/>
-                          <a:r>
-                            <a:rPr lang="en-US" dirty="0" smtClean="0"/>
-                            <a:t>18.918</a:t>
-                          </a:r>
-                        </a:p>
-                        <a:p>
-                          <a:pPr algn="ctr"/>
-                          <a:r>
-                            <a:rPr lang="en-US" dirty="0" smtClean="0"/>
-                            <a:t>19.375</a:t>
-                          </a:r>
-                        </a:p>
-                        <a:p>
-                          <a:pPr algn="ctr"/>
-                          <a:r>
-                            <a:rPr lang="en-US" dirty="0" smtClean="0"/>
-                            <a:t>20.168</a:t>
-                          </a:r>
-                          <a:endParaRPr lang="en-US" dirty="0"/>
-                        </a:p>
-                      </a:txBody>
-                      <a:tcPr marL="0" marR="0" marT="0" marB="0"/>
-                    </a:tc>
-                    <a:tc>
-                      <a:txBody>
-                        <a:bodyPr/>
-                        <a:lstStyle/>
-                        <a:p>
-                          <a:pPr algn="ctr"/>
-                          <a14:m/>
-                          <a:endParaRPr lang="en-US" dirty="0" smtClean="0"/>
-                        </a:p>
-                        <a:p>
-                          <a:pPr algn="ctr"/>
-                          <a:r>
-                            <a:rPr lang="en-US" dirty="0" smtClean="0"/>
-                            <a:t>392</a:t>
-                          </a:r>
-                        </a:p>
-                        <a:p>
-                          <a:pPr algn="ctr"/>
-                          <a:r>
-                            <a:rPr lang="en-US" dirty="0" smtClean="0"/>
-                            <a:t>636</a:t>
-                          </a:r>
-                        </a:p>
-                        <a:p>
-                          <a:pPr algn="ctr"/>
-                          <a:r>
-                            <a:rPr lang="en-US" dirty="0" smtClean="0"/>
-                            <a:t>940</a:t>
-                          </a:r>
-                        </a:p>
-                        <a:p>
-                          <a:pPr algn="ctr"/>
-                          <a14:m/>
-                          <a:endParaRPr lang="en-US" dirty="0"/>
-                        </a:p>
-                      </a:txBody>
-                      <a:tcPr marL="0" marR="0" marT="0" marB="0"/>
-                    </a:tc>
-                    <a:tc>
-                      <a:txBody>
-                        <a:bodyPr/>
-                        <a:lstStyle/>
-                        <a:p>
-                          <a:pPr algn="ctr"/>
-                          <a14:m/>
-                          <a:endParaRPr lang="en-US" dirty="0" smtClean="0"/>
-                        </a:p>
-                        <a:p>
-                          <a:pPr algn="ctr"/>
-                          <a:r>
-                            <a:rPr lang="en-US" dirty="0" smtClean="0"/>
-                            <a:t>37.218</a:t>
-                          </a:r>
-                        </a:p>
-                        <a:p>
-                          <a:pPr algn="ctr"/>
-                          <a:r>
-                            <a:rPr lang="en-US" dirty="0" smtClean="0"/>
-                            <a:t>48.703</a:t>
-                          </a:r>
-                        </a:p>
-                        <a:p>
-                          <a:pPr algn="ctr"/>
-                          <a:r>
-                            <a:rPr lang="en-US" dirty="0" smtClean="0"/>
-                            <a:t>62.718</a:t>
-                          </a:r>
-                        </a:p>
-                        <a:p>
-                          <a:pPr algn="ctr"/>
-                          <a14:m/>
-                          <a:endParaRPr lang="en-US" dirty="0"/>
-                        </a:p>
-                      </a:txBody>
-                      <a:tcPr marL="0" marR="0" marT="0" marB="0"/>
-                    </a:tc>
-                  </a:tr>
-                </a:tbl>
-              </a:graphicData>
-            </a:graphic>
-          </p:graphicFrame>
-        </mc:Choice>
-        <mc:Fallback xmlns="">
-          <p:graphicFrame>
-            <p:nvGraphicFramePr>
-              <p:cNvPr id="3" name="Table 2"/>
-              <p:cNvGraphicFramePr>
-                <a:graphicFrameLocks noGrp="1"/>
-              </p:cNvGraphicFramePr>
-              <p:nvPr>
-                <p:extLst>
-                  <p:ext uri="{D42A27DB-BD31-4B8C-83A1-F6EECF244321}">
-                    <p14:modId xmlns:p14="http://schemas.microsoft.com/office/powerpoint/2010/main" val="3316487501"/>
-                  </p:ext>
-                </p:extLst>
-              </p:nvPr>
-            </p:nvGraphicFramePr>
-            <p:xfrm>
-              <a:off x="990600" y="2514600"/>
-              <a:ext cx="7162800" cy="2113280"/>
-            </p:xfrm>
-            <a:graphic>
-              <a:graphicData uri="http://schemas.openxmlformats.org/drawingml/2006/table">
-                <a:tbl>
-                  <a:tblPr firstRow="1" bandRow="1">
-                    <a:tableStyleId>{5C22544A-7EE6-4342-B048-85BDC9FD1C3A}</a:tableStyleId>
-                  </a:tblPr>
-                  <a:tblGrid>
-                    <a:gridCol w="1193800"/>
-                    <a:gridCol w="1193800"/>
-                    <a:gridCol w="1117600"/>
-                    <a:gridCol w="1295400"/>
-                    <a:gridCol w="1066800"/>
-                    <a:gridCol w="1295400"/>
-                  </a:tblGrid>
-                  <a:tr h="370840">
-                    <a:tc gridSpan="2">
-                      <a:txBody>
-                        <a:bodyPr/>
-                        <a:lstStyle/>
-                        <a:p>
-                          <a:pPr algn="ctr"/>
-                          <a:r>
-                            <a:rPr lang="en-US" dirty="0" smtClean="0"/>
-                            <a:t>Test Programs</a:t>
-                          </a:r>
-                          <a:endParaRPr lang="en-US" dirty="0"/>
-                        </a:p>
-                      </a:txBody>
-                      <a:tcPr marL="0" marR="0" marT="0" marB="0"/>
-                    </a:tc>
-                    <a:tc hMerge="1">
-                      <a:txBody>
-                        <a:bodyPr/>
-                        <a:lstStyle/>
-                        <a:p>
-                          <a:endParaRPr lang="en-US"/>
-                        </a:p>
-                      </a:txBody>
-                      <a:tcPr/>
-                    </a:tc>
-                    <a:tc gridSpan="2">
-                      <a:txBody>
-                        <a:bodyPr/>
-                        <a:lstStyle/>
-                        <a:p>
-                          <a:pPr algn="ctr"/>
-                          <a:r>
-                            <a:rPr lang="en-US" dirty="0" smtClean="0"/>
-                            <a:t>Our Encoding</a:t>
-                          </a:r>
-                          <a:endParaRPr lang="en-US" dirty="0"/>
-                        </a:p>
-                      </a:txBody>
-                      <a:tcPr marL="0" marR="0" marT="0" marB="0"/>
-                    </a:tc>
-                    <a:tc hMerge="1">
-                      <a:txBody>
-                        <a:bodyPr/>
-                        <a:lstStyle/>
-                        <a:p>
-                          <a:endParaRPr lang="en-US"/>
-                        </a:p>
-                      </a:txBody>
-                      <a:tcPr/>
-                    </a:tc>
-                    <a:tc gridSpan="2">
-                      <a:txBody>
-                        <a:bodyPr/>
-                        <a:lstStyle/>
-                        <a:p>
-                          <a:pPr algn="ctr"/>
-                          <a:r>
-                            <a:rPr lang="en-US" dirty="0" err="1" smtClean="0"/>
-                            <a:t>Elwakil’s</a:t>
-                          </a:r>
-                          <a:r>
-                            <a:rPr lang="en-US" dirty="0" smtClean="0"/>
-                            <a:t> Encoding</a:t>
-                          </a:r>
-                          <a:endParaRPr lang="en-US" dirty="0"/>
-                        </a:p>
-                      </a:txBody>
-                      <a:tcPr marL="0" marR="0" marT="0" marB="0"/>
-                    </a:tc>
-                    <a:tc hMerge="1">
-                      <a:txBody>
-                        <a:bodyPr/>
-                        <a:lstStyle/>
-                        <a:p>
-                          <a:endParaRPr lang="en-US"/>
-                        </a:p>
-                      </a:txBody>
-                      <a:tcPr/>
-                    </a:tc>
-                  </a:tr>
-                  <a:tr h="370840">
-                    <a:tc>
-                      <a:txBody>
-                        <a:bodyPr/>
-                        <a:lstStyle/>
-                        <a:p>
-                          <a:pPr algn="ctr"/>
-                          <a:r>
-                            <a:rPr lang="en-US" dirty="0" smtClean="0"/>
-                            <a:t>Name</a:t>
-                          </a:r>
-                          <a:endParaRPr lang="en-US" dirty="0"/>
-                        </a:p>
-                      </a:txBody>
-                      <a:tcPr marL="0" marR="0" marT="0" marB="0"/>
-                    </a:tc>
-                    <a:tc>
-                      <a:txBody>
-                        <a:bodyPr/>
-                        <a:lstStyle/>
-                        <a:p>
-                          <a:pPr algn="ctr"/>
-                          <a:r>
-                            <a:rPr lang="en-US" dirty="0" smtClean="0"/>
-                            <a:t>#</a:t>
-                          </a:r>
-                          <a:r>
-                            <a:rPr lang="en-US" dirty="0" err="1" smtClean="0"/>
-                            <a:t>Msg</a:t>
-                          </a:r>
-                          <a:endParaRPr lang="en-US" dirty="0"/>
-                        </a:p>
-                      </a:txBody>
-                      <a:tcPr marL="0" marR="0" marT="0" marB="0"/>
-                    </a:tc>
-                    <a:tc>
-                      <a:txBody>
-                        <a:bodyPr/>
-                        <a:lstStyle/>
-                        <a:p>
-                          <a:pPr algn="ctr"/>
-                          <a:r>
-                            <a:rPr lang="en-US" dirty="0" smtClean="0"/>
-                            <a:t>Time(</a:t>
-                          </a:r>
-                          <a:r>
-                            <a:rPr lang="en-US" dirty="0" err="1" smtClean="0"/>
-                            <a:t>ms</a:t>
-                          </a:r>
-                          <a:r>
-                            <a:rPr lang="en-US" dirty="0" smtClean="0"/>
-                            <a:t>)</a:t>
-                          </a:r>
-                          <a:endParaRPr lang="en-US" dirty="0"/>
-                        </a:p>
-                      </a:txBody>
-                      <a:tcPr marL="0" marR="0" marT="0" marB="0"/>
-                    </a:tc>
-                    <a:tc>
-                      <a:txBody>
-                        <a:bodyPr/>
-                        <a:lstStyle/>
-                        <a:p>
-                          <a:pPr algn="ctr"/>
-                          <a:r>
-                            <a:rPr lang="en-US" dirty="0" smtClean="0"/>
-                            <a:t>Memory(MB)</a:t>
-                          </a:r>
-                          <a:endParaRPr lang="en-US" dirty="0"/>
-                        </a:p>
-                      </a:txBody>
-                      <a:tcPr marL="0" marR="0" marT="0" marB="0"/>
-                    </a:tc>
-                    <a:tc>
-                      <a:txBody>
-                        <a:bodyPr/>
-                        <a:lstStyle/>
-                        <a:p>
-                          <a:pPr algn="ctr"/>
-                          <a:r>
-                            <a:rPr lang="en-US" dirty="0" smtClean="0"/>
-                            <a:t>Time(</a:t>
-                          </a:r>
-                          <a:r>
-                            <a:rPr lang="en-US" dirty="0" err="1" smtClean="0"/>
-                            <a:t>ms</a:t>
-                          </a:r>
-                          <a:r>
-                            <a:rPr lang="en-US" dirty="0" smtClean="0"/>
-                            <a:t>)</a:t>
-                          </a:r>
-                          <a:endParaRPr lang="en-US" dirty="0"/>
-                        </a:p>
-                      </a:txBody>
-                      <a:tcPr marL="0" marR="0" marT="0" marB="0"/>
-                    </a:tc>
-                    <a:tc>
-                      <a:txBody>
-                        <a:bodyPr/>
-                        <a:lstStyle/>
-                        <a:p>
-                          <a:pPr algn="ctr"/>
-                          <a:r>
-                            <a:rPr lang="en-US" dirty="0" smtClean="0"/>
-                            <a:t>Memory(MB)</a:t>
-                          </a:r>
-                          <a:endParaRPr lang="en-US" dirty="0"/>
-                        </a:p>
-                      </a:txBody>
-                      <a:tcPr marL="0" marR="0" marT="0" marB="0"/>
-                    </a:tc>
-                  </a:tr>
-                  <a:tr h="1371600">
-                    <a:tc>
-                      <a:txBody>
-                        <a:bodyPr/>
-                        <a:lstStyle/>
-                        <a:p>
-                          <a:pPr algn="ctr"/>
-                          <a:r>
-                            <a:rPr lang="en-US" dirty="0" smtClean="0"/>
-                            <a:t>Leader</a:t>
-                          </a:r>
-                        </a:p>
-                        <a:p>
-                          <a:pPr algn="ctr"/>
-                          <a:r>
-                            <a:rPr lang="en-US" dirty="0" smtClean="0"/>
-                            <a:t>5ites</a:t>
-                          </a:r>
-                        </a:p>
-                        <a:p>
-                          <a:pPr algn="ctr"/>
-                          <a:r>
-                            <a:rPr lang="en-US" dirty="0" smtClean="0"/>
-                            <a:t>6ites</a:t>
-                          </a:r>
-                        </a:p>
-                        <a:p>
-                          <a:pPr algn="ctr"/>
-                          <a:r>
-                            <a:rPr lang="en-US" dirty="0" smtClean="0"/>
-                            <a:t>7ites</a:t>
-                          </a:r>
-                        </a:p>
-                        <a:p>
-                          <a:pPr algn="ctr"/>
-                          <a:r>
-                            <a:rPr lang="en-US" dirty="0" smtClean="0"/>
-                            <a:t>8ites</a:t>
-                          </a:r>
-                          <a:endParaRPr lang="en-US" dirty="0"/>
-                        </a:p>
-                      </a:txBody>
-                      <a:tcPr marL="0" marR="0" marT="0" marB="0"/>
-                    </a:tc>
-                    <a:tc>
-                      <a:txBody>
-                        <a:bodyPr/>
-                        <a:lstStyle/>
-                        <a:p>
-                          <a:pPr algn="ctr"/>
-                          <a:r>
-                            <a:rPr lang="en-US" dirty="0" smtClean="0"/>
-                            <a:t>30</a:t>
-                          </a:r>
-                        </a:p>
-                        <a:p>
-                          <a:pPr algn="ctr"/>
-                          <a:r>
-                            <a:rPr lang="en-US" dirty="0" smtClean="0"/>
-                            <a:t>15</a:t>
-                          </a:r>
-                        </a:p>
-                        <a:p>
-                          <a:pPr algn="ctr"/>
-                          <a:r>
-                            <a:rPr lang="en-US" dirty="0" smtClean="0"/>
-                            <a:t>18</a:t>
-                          </a:r>
-                        </a:p>
-                        <a:p>
-                          <a:pPr algn="ctr"/>
-                          <a:r>
-                            <a:rPr lang="en-US" dirty="0" smtClean="0"/>
-                            <a:t>21</a:t>
-                          </a:r>
-                        </a:p>
-                        <a:p>
-                          <a:pPr algn="ctr"/>
-                          <a:r>
-                            <a:rPr lang="en-US" dirty="0" smtClean="0"/>
-                            <a:t>24</a:t>
-                          </a:r>
-                          <a:endParaRPr lang="en-US" dirty="0"/>
-                        </a:p>
-                      </a:txBody>
-                      <a:tcPr marL="0" marR="0" marT="0" marB="0"/>
-                    </a:tc>
-                    <a:tc>
-                      <a:txBody>
-                        <a:bodyPr/>
-                        <a:lstStyle/>
-                        <a:p>
-                          <a:pPr algn="ctr"/>
-                          <a:r>
-                            <a:rPr lang="en-US" dirty="0" smtClean="0"/>
-                            <a:t>120</a:t>
-                          </a:r>
-                        </a:p>
-                        <a:p>
-                          <a:pPr algn="ctr"/>
-                          <a:r>
-                            <a:rPr lang="en-US" dirty="0" smtClean="0"/>
-                            <a:t>72</a:t>
-                          </a:r>
-                        </a:p>
-                        <a:p>
-                          <a:pPr algn="ctr"/>
-                          <a:r>
-                            <a:rPr lang="en-US" dirty="0" smtClean="0"/>
-                            <a:t>72</a:t>
-                          </a:r>
-                        </a:p>
-                        <a:p>
-                          <a:pPr algn="ctr"/>
-                          <a:r>
-                            <a:rPr lang="en-US" dirty="0" smtClean="0"/>
-                            <a:t>80</a:t>
-                          </a:r>
-                        </a:p>
-                        <a:p>
-                          <a:pPr algn="ctr"/>
-                          <a:r>
-                            <a:rPr lang="en-US" dirty="0" smtClean="0"/>
-                            <a:t>96</a:t>
-                          </a:r>
-                          <a:endParaRPr lang="en-US" dirty="0"/>
-                        </a:p>
-                      </a:txBody>
-                      <a:tcPr marL="0" marR="0" marT="0" marB="0"/>
-                    </a:tc>
-                    <a:tc>
-                      <a:txBody>
-                        <a:bodyPr/>
-                        <a:lstStyle/>
-                        <a:p>
-                          <a:pPr algn="ctr"/>
-                          <a:r>
-                            <a:rPr lang="en-US" dirty="0" smtClean="0"/>
-                            <a:t>25.473</a:t>
-                          </a:r>
-                        </a:p>
-                        <a:p>
-                          <a:pPr algn="ctr"/>
-                          <a:r>
-                            <a:rPr lang="en-US" dirty="0" smtClean="0"/>
-                            <a:t>18.519</a:t>
-                          </a:r>
-                        </a:p>
-                        <a:p>
-                          <a:pPr algn="ctr"/>
-                          <a:r>
-                            <a:rPr lang="en-US" dirty="0" smtClean="0"/>
-                            <a:t>18.918</a:t>
-                          </a:r>
-                        </a:p>
-                        <a:p>
-                          <a:pPr algn="ctr"/>
-                          <a:r>
-                            <a:rPr lang="en-US" dirty="0" smtClean="0"/>
-                            <a:t>19.375</a:t>
-                          </a:r>
-                        </a:p>
-                        <a:p>
-                          <a:pPr algn="ctr"/>
-                          <a:r>
-                            <a:rPr lang="en-US" dirty="0" smtClean="0"/>
-                            <a:t>20.168</a:t>
-                          </a:r>
-                          <a:endParaRPr lang="en-US" dirty="0"/>
-                        </a:p>
-                      </a:txBody>
-                      <a:tcPr marL="0" marR="0" marT="0" marB="0"/>
-                    </a:tc>
-                    <a:tc>
-                      <a:txBody>
-                        <a:bodyPr/>
-                        <a:lstStyle/>
-                        <a:p>
-                          <a:endParaRPr lang="zh-CN"/>
-                        </a:p>
-                      </a:txBody>
-                      <a:tcPr marL="0" marR="0" marT="0" marB="0">
-                        <a:blipFill rotWithShape="1">
-                          <a:blip r:embed="rId2"/>
-                          <a:stretch>
-                            <a:fillRect l="-450857" t="-59556" r="-121143" b="-10667"/>
-                          </a:stretch>
-                        </a:blipFill>
-                      </a:tcPr>
-                    </a:tc>
-                    <a:tc>
-                      <a:txBody>
-                        <a:bodyPr/>
-                        <a:lstStyle/>
-                        <a:p>
-                          <a:endParaRPr lang="zh-CN"/>
-                        </a:p>
-                      </a:txBody>
-                      <a:tcPr marL="0" marR="0" marT="0" marB="0">
-                        <a:blipFill rotWithShape="1">
-                          <a:blip r:embed="rId2"/>
-                          <a:stretch>
-                            <a:fillRect l="-454717" t="-59556" b="-10667"/>
-                          </a:stretch>
-                        </a:blipFill>
-                      </a:tcPr>
-                    </a:tc>
-                  </a:tr>
-                </a:tbl>
-              </a:graphicData>
-            </a:graphic>
-          </p:graphicFrame>
-        </mc:Fallback>
-      </mc:AlternateContent>
+      <p:graphicFrame>
+        <p:nvGraphicFramePr>
+          <p:cNvPr id="3" name="Table 2"/>
+          <p:cNvGraphicFramePr>
+            <a:graphicFrameLocks noGrp="1"/>
+          </p:cNvGraphicFramePr>
+          <p:nvPr>
+            <p:extLst>
+              <p:ext uri="{D42A27DB-BD31-4B8C-83A1-F6EECF244321}">
+                <p14:modId xmlns:p14="http://schemas.microsoft.com/office/powerpoint/2010/main" val="3316487501"/>
+              </p:ext>
+            </p:extLst>
+          </p:nvPr>
+        </p:nvGraphicFramePr>
+        <p:xfrm>
+          <a:off x="990600" y="2514600"/>
+          <a:ext cx="7162800" cy="2113280"/>
+        </p:xfrm>
+        <a:graphic>
+          <a:graphicData uri="http://schemas.openxmlformats.org/drawingml/2006/table">
+            <a:tbl>
+              <a:tblPr firstRow="1" bandRow="1">
+                <a:tableStyleId>{5C22544A-7EE6-4342-B048-85BDC9FD1C3A}</a:tableStyleId>
+              </a:tblPr>
+              <a:tblGrid>
+                <a:gridCol w="1193800"/>
+                <a:gridCol w="1193800"/>
+                <a:gridCol w="1117600"/>
+                <a:gridCol w="1295400"/>
+                <a:gridCol w="1066800"/>
+                <a:gridCol w="1295400"/>
+              </a:tblGrid>
+              <a:tr h="370840">
+                <a:tc gridSpan="2">
+                  <a:txBody>
+                    <a:bodyPr/>
+                    <a:lstStyle/>
+                    <a:p>
+                      <a:pPr algn="ctr"/>
+                      <a:r>
+                        <a:rPr lang="en-US" dirty="0" smtClean="0"/>
+                        <a:t>Test Programs</a:t>
+                      </a:r>
+                      <a:endParaRPr lang="en-US" dirty="0"/>
+                    </a:p>
+                  </a:txBody>
+                  <a:tcPr marL="0" marR="0" marT="0" marB="0"/>
+                </a:tc>
+                <a:tc hMerge="1">
+                  <a:txBody>
+                    <a:bodyPr/>
+                    <a:lstStyle/>
+                    <a:p>
+                      <a:endParaRPr lang="en-US"/>
+                    </a:p>
+                  </a:txBody>
+                  <a:tcPr/>
+                </a:tc>
+                <a:tc gridSpan="2">
+                  <a:txBody>
+                    <a:bodyPr/>
+                    <a:lstStyle/>
+                    <a:p>
+                      <a:pPr algn="ctr"/>
+                      <a:r>
+                        <a:rPr lang="en-US" dirty="0" smtClean="0"/>
+                        <a:t>Our Encoding</a:t>
+                      </a:r>
+                      <a:endParaRPr lang="en-US" dirty="0"/>
+                    </a:p>
+                  </a:txBody>
+                  <a:tcPr marL="0" marR="0" marT="0" marB="0"/>
+                </a:tc>
+                <a:tc hMerge="1">
+                  <a:txBody>
+                    <a:bodyPr/>
+                    <a:lstStyle/>
+                    <a:p>
+                      <a:endParaRPr lang="en-US"/>
+                    </a:p>
+                  </a:txBody>
+                  <a:tcPr/>
+                </a:tc>
+                <a:tc gridSpan="2">
+                  <a:txBody>
+                    <a:bodyPr/>
+                    <a:lstStyle/>
+                    <a:p>
+                      <a:pPr algn="ctr"/>
+                      <a:r>
+                        <a:rPr lang="en-US" dirty="0" err="1" smtClean="0"/>
+                        <a:t>Elwakil’s</a:t>
+                      </a:r>
+                      <a:r>
+                        <a:rPr lang="en-US" dirty="0" smtClean="0"/>
+                        <a:t> Encoding</a:t>
+                      </a:r>
+                      <a:endParaRPr lang="en-US" dirty="0"/>
+                    </a:p>
+                  </a:txBody>
+                  <a:tcPr marL="0" marR="0" marT="0" marB="0"/>
+                </a:tc>
+                <a:tc hMerge="1">
+                  <a:txBody>
+                    <a:bodyPr/>
+                    <a:lstStyle/>
+                    <a:p>
+                      <a:endParaRPr lang="en-US"/>
+                    </a:p>
+                  </a:txBody>
+                  <a:tcPr/>
+                </a:tc>
+              </a:tr>
+              <a:tr h="370840">
+                <a:tc>
+                  <a:txBody>
+                    <a:bodyPr/>
+                    <a:lstStyle/>
+                    <a:p>
+                      <a:pPr algn="ctr"/>
+                      <a:r>
+                        <a:rPr lang="en-US" dirty="0" smtClean="0"/>
+                        <a:t>Name</a:t>
+                      </a:r>
+                      <a:endParaRPr lang="en-US" dirty="0"/>
+                    </a:p>
+                  </a:txBody>
+                  <a:tcPr marL="0" marR="0" marT="0" marB="0"/>
+                </a:tc>
+                <a:tc>
+                  <a:txBody>
+                    <a:bodyPr/>
+                    <a:lstStyle/>
+                    <a:p>
+                      <a:pPr algn="ctr"/>
+                      <a:r>
+                        <a:rPr lang="en-US" dirty="0" smtClean="0"/>
+                        <a:t>#</a:t>
+                      </a:r>
+                      <a:r>
+                        <a:rPr lang="en-US" dirty="0" err="1" smtClean="0"/>
+                        <a:t>Msg</a:t>
+                      </a:r>
+                      <a:endParaRPr lang="en-US" dirty="0"/>
+                    </a:p>
+                  </a:txBody>
+                  <a:tcPr marL="0" marR="0" marT="0" marB="0"/>
+                </a:tc>
+                <a:tc>
+                  <a:txBody>
+                    <a:bodyPr/>
+                    <a:lstStyle/>
+                    <a:p>
+                      <a:pPr algn="ctr"/>
+                      <a:r>
+                        <a:rPr lang="en-US" dirty="0" smtClean="0"/>
+                        <a:t>Time(</a:t>
+                      </a:r>
+                      <a:r>
+                        <a:rPr lang="en-US" dirty="0" err="1" smtClean="0"/>
+                        <a:t>ms</a:t>
+                      </a:r>
+                      <a:r>
+                        <a:rPr lang="en-US" dirty="0" smtClean="0"/>
+                        <a:t>)</a:t>
+                      </a:r>
+                      <a:endParaRPr lang="en-US" dirty="0"/>
+                    </a:p>
+                  </a:txBody>
+                  <a:tcPr marL="0" marR="0" marT="0" marB="0"/>
+                </a:tc>
+                <a:tc>
+                  <a:txBody>
+                    <a:bodyPr/>
+                    <a:lstStyle/>
+                    <a:p>
+                      <a:pPr algn="ctr"/>
+                      <a:r>
+                        <a:rPr lang="en-US" dirty="0" smtClean="0"/>
+                        <a:t>Memory(MB)</a:t>
+                      </a:r>
+                      <a:endParaRPr lang="en-US" dirty="0"/>
+                    </a:p>
+                  </a:txBody>
+                  <a:tcPr marL="0" marR="0" marT="0" marB="0"/>
+                </a:tc>
+                <a:tc>
+                  <a:txBody>
+                    <a:bodyPr/>
+                    <a:lstStyle/>
+                    <a:p>
+                      <a:pPr algn="ctr"/>
+                      <a:r>
+                        <a:rPr lang="en-US" dirty="0" smtClean="0"/>
+                        <a:t>Time(</a:t>
+                      </a:r>
+                      <a:r>
+                        <a:rPr lang="en-US" dirty="0" err="1" smtClean="0"/>
+                        <a:t>ms</a:t>
+                      </a:r>
+                      <a:r>
+                        <a:rPr lang="en-US" dirty="0" smtClean="0"/>
+                        <a:t>)</a:t>
+                      </a:r>
+                      <a:endParaRPr lang="en-US" dirty="0"/>
+                    </a:p>
+                  </a:txBody>
+                  <a:tcPr marL="0" marR="0" marT="0" marB="0"/>
+                </a:tc>
+                <a:tc>
+                  <a:txBody>
+                    <a:bodyPr/>
+                    <a:lstStyle/>
+                    <a:p>
+                      <a:pPr algn="ctr"/>
+                      <a:r>
+                        <a:rPr lang="en-US" dirty="0" smtClean="0"/>
+                        <a:t>Memory(MB)</a:t>
+                      </a:r>
+                      <a:endParaRPr lang="en-US" dirty="0"/>
+                    </a:p>
+                  </a:txBody>
+                  <a:tcPr marL="0" marR="0" marT="0" marB="0"/>
+                </a:tc>
+              </a:tr>
+              <a:tr h="370840">
+                <a:tc>
+                  <a:txBody>
+                    <a:bodyPr/>
+                    <a:lstStyle/>
+                    <a:p>
+                      <a:pPr algn="ctr"/>
+                      <a:r>
+                        <a:rPr lang="en-US" dirty="0" smtClean="0"/>
+                        <a:t>Leader</a:t>
+                      </a:r>
+                    </a:p>
+                    <a:p>
+                      <a:pPr algn="ctr"/>
+                      <a:r>
+                        <a:rPr lang="en-US" dirty="0" smtClean="0"/>
+                        <a:t>5ites</a:t>
+                      </a:r>
+                    </a:p>
+                    <a:p>
+                      <a:pPr algn="ctr"/>
+                      <a:r>
+                        <a:rPr lang="en-US" dirty="0" smtClean="0"/>
+                        <a:t>6ites</a:t>
+                      </a:r>
+                    </a:p>
+                    <a:p>
+                      <a:pPr algn="ctr"/>
+                      <a:r>
+                        <a:rPr lang="en-US" dirty="0" smtClean="0"/>
+                        <a:t>7ites</a:t>
+                      </a:r>
+                    </a:p>
+                    <a:p>
+                      <a:pPr algn="ctr"/>
+                      <a:r>
+                        <a:rPr lang="en-US" dirty="0" smtClean="0"/>
+                        <a:t>8ites</a:t>
+                      </a:r>
+                      <a:endParaRPr lang="en-US" dirty="0"/>
+                    </a:p>
+                  </a:txBody>
+                  <a:tcPr marL="0" marR="0" marT="0" marB="0"/>
+                </a:tc>
+                <a:tc>
+                  <a:txBody>
+                    <a:bodyPr/>
+                    <a:lstStyle/>
+                    <a:p>
+                      <a:pPr algn="ctr"/>
+                      <a:r>
+                        <a:rPr lang="en-US" dirty="0" smtClean="0"/>
+                        <a:t>30</a:t>
+                      </a:r>
+                    </a:p>
+                    <a:p>
+                      <a:pPr algn="ctr"/>
+                      <a:r>
+                        <a:rPr lang="en-US" dirty="0" smtClean="0"/>
+                        <a:t>15</a:t>
+                      </a:r>
+                    </a:p>
+                    <a:p>
+                      <a:pPr algn="ctr"/>
+                      <a:r>
+                        <a:rPr lang="en-US" dirty="0" smtClean="0"/>
+                        <a:t>18</a:t>
+                      </a:r>
+                    </a:p>
+                    <a:p>
+                      <a:pPr algn="ctr"/>
+                      <a:r>
+                        <a:rPr lang="en-US" dirty="0" smtClean="0"/>
+                        <a:t>21</a:t>
+                      </a:r>
+                    </a:p>
+                    <a:p>
+                      <a:pPr algn="ctr"/>
+                      <a:r>
+                        <a:rPr lang="en-US" dirty="0" smtClean="0"/>
+                        <a:t>24</a:t>
+                      </a:r>
+                      <a:endParaRPr lang="en-US" dirty="0"/>
+                    </a:p>
+                  </a:txBody>
+                  <a:tcPr marL="0" marR="0" marT="0" marB="0"/>
+                </a:tc>
+                <a:tc>
+                  <a:txBody>
+                    <a:bodyPr/>
+                    <a:lstStyle/>
+                    <a:p>
+                      <a:pPr algn="ctr"/>
+                      <a:r>
+                        <a:rPr lang="en-US" dirty="0" smtClean="0"/>
+                        <a:t>120</a:t>
+                      </a:r>
+                    </a:p>
+                    <a:p>
+                      <a:pPr algn="ctr"/>
+                      <a:r>
+                        <a:rPr lang="en-US" dirty="0" smtClean="0"/>
+                        <a:t>72</a:t>
+                      </a:r>
+                    </a:p>
+                    <a:p>
+                      <a:pPr algn="ctr"/>
+                      <a:r>
+                        <a:rPr lang="en-US" dirty="0" smtClean="0"/>
+                        <a:t>72</a:t>
+                      </a:r>
+                    </a:p>
+                    <a:p>
+                      <a:pPr algn="ctr"/>
+                      <a:r>
+                        <a:rPr lang="en-US" dirty="0" smtClean="0"/>
+                        <a:t>80</a:t>
+                      </a:r>
+                    </a:p>
+                    <a:p>
+                      <a:pPr algn="ctr"/>
+                      <a:r>
+                        <a:rPr lang="en-US" dirty="0" smtClean="0"/>
+                        <a:t>96</a:t>
+                      </a:r>
+                      <a:endParaRPr lang="en-US" dirty="0"/>
+                    </a:p>
+                  </a:txBody>
+                  <a:tcPr marL="0" marR="0" marT="0" marB="0"/>
+                </a:tc>
+                <a:tc>
+                  <a:txBody>
+                    <a:bodyPr/>
+                    <a:lstStyle/>
+                    <a:p>
+                      <a:pPr algn="ctr"/>
+                      <a:r>
+                        <a:rPr lang="en-US" dirty="0" smtClean="0"/>
+                        <a:t>25.473</a:t>
+                      </a:r>
+                    </a:p>
+                    <a:p>
+                      <a:pPr algn="ctr"/>
+                      <a:r>
+                        <a:rPr lang="en-US" dirty="0" smtClean="0"/>
+                        <a:t>18.519</a:t>
+                      </a:r>
+                    </a:p>
+                    <a:p>
+                      <a:pPr algn="ctr"/>
+                      <a:r>
+                        <a:rPr lang="en-US" dirty="0" smtClean="0"/>
+                        <a:t>18.918</a:t>
+                      </a:r>
+                    </a:p>
+                    <a:p>
+                      <a:pPr algn="ctr"/>
+                      <a:r>
+                        <a:rPr lang="en-US" dirty="0" smtClean="0"/>
+                        <a:t>19.375</a:t>
+                      </a:r>
+                    </a:p>
+                    <a:p>
+                      <a:pPr algn="ctr"/>
+                      <a:r>
+                        <a:rPr lang="en-US" dirty="0" smtClean="0"/>
+                        <a:t>20.168</a:t>
+                      </a:r>
+                      <a:endParaRPr lang="en-US" dirty="0"/>
+                    </a:p>
+                  </a:txBody>
+                  <a:tcPr marL="0" marR="0" marT="0" marB="0"/>
+                </a:tc>
+                <a:tc>
+                  <a:txBody>
+                    <a:bodyPr/>
+                    <a:lstStyle/>
+                    <a:p>
+                      <a:pPr algn="ctr"/>
+                      <a:endParaRPr lang="en-US" dirty="0" smtClean="0"/>
+                    </a:p>
+                    <a:p>
+                      <a:pPr algn="ctr"/>
+                      <a:r>
+                        <a:rPr lang="en-US" dirty="0" smtClean="0"/>
+                        <a:t>392</a:t>
+                      </a:r>
+                    </a:p>
+                    <a:p>
+                      <a:pPr algn="ctr"/>
+                      <a:r>
+                        <a:rPr lang="en-US" dirty="0" smtClean="0"/>
+                        <a:t>636</a:t>
+                      </a:r>
+                    </a:p>
+                    <a:p>
+                      <a:pPr algn="ctr"/>
+                      <a:r>
+                        <a:rPr lang="en-US" dirty="0" smtClean="0"/>
+                        <a:t>940</a:t>
+                      </a:r>
+                    </a:p>
+                    <a:p>
+                      <a:pPr algn="ctr"/>
+                      <a:endParaRPr lang="en-US" dirty="0"/>
+                    </a:p>
+                  </a:txBody>
+                  <a:tcPr marL="0" marR="0" marT="0" marB="0"/>
+                </a:tc>
+                <a:tc>
+                  <a:txBody>
+                    <a:bodyPr/>
+                    <a:lstStyle/>
+                    <a:p>
+                      <a:pPr algn="ctr"/>
+                      <a:endParaRPr lang="en-US" dirty="0" smtClean="0"/>
+                    </a:p>
+                    <a:p>
+                      <a:pPr algn="ctr"/>
+                      <a:r>
+                        <a:rPr lang="en-US" dirty="0" smtClean="0"/>
+                        <a:t>37.218</a:t>
+                      </a:r>
+                    </a:p>
+                    <a:p>
+                      <a:pPr algn="ctr"/>
+                      <a:r>
+                        <a:rPr lang="en-US" dirty="0" smtClean="0"/>
+                        <a:t>48.703</a:t>
+                      </a:r>
+                    </a:p>
+                    <a:p>
+                      <a:pPr algn="ctr"/>
+                      <a:r>
+                        <a:rPr lang="en-US" dirty="0" smtClean="0"/>
+                        <a:t>62.718</a:t>
+                      </a:r>
+                    </a:p>
+                    <a:p>
+                      <a:pPr algn="ctr"/>
+                      <a:endParaRPr lang="en-US" dirty="0"/>
+                    </a:p>
+                  </a:txBody>
+                  <a:tcPr marL="0" marR="0" marT="0" marB="0"/>
+                </a:tc>
+              </a:tr>
+            </a:tbl>
+          </a:graphicData>
+        </a:graphic>
+      </p:graphicFrame>
     </p:spTree>
     <p:extLst>
       <p:ext uri="{BB962C8B-B14F-4D97-AF65-F5344CB8AC3E}">
@@ -33648,7 +33482,7 @@
   <p:timing>
     <p:tnLst>
       <p:par>
-        <p:cTn xmlns:p14="http://schemas.microsoft.com/office/powerpoint/2010/main" id="1" dur="indefinite" restart="never" nodeType="tmRoot"/>
+        <p:cTn id="1" dur="indefinite" restart="never" nodeType="tmRoot"/>
       </p:par>
     </p:tnLst>
   </p:timing>
@@ -33866,13 +33700,20 @@
           <a:p>
             <a:r>
               <a:rPr lang="en-US" sz="2000" dirty="0" smtClean="0"/>
-              <a:t>The experiment shows that our encoding reduces 70% of that of the existing work, and runs average eight times faster and uses two times less memory</a:t>
+              <a:t>The experiment shows that our encoding reduces 70% </a:t>
             </a:r>
             <a:r>
               <a:rPr lang="en-US" sz="2000" dirty="0" smtClean="0"/>
-              <a:t>. FIX BULLET</a:t>
-            </a:r>
-            <a:endParaRPr lang="en-US" sz="2000" dirty="0" smtClean="0"/>
+              <a:t>Clauses </a:t>
+            </a:r>
+            <a:r>
+              <a:rPr lang="en-US" sz="2000" dirty="0" smtClean="0"/>
+              <a:t>Compared to </a:t>
+            </a:r>
+            <a:r>
+              <a:rPr lang="en-US" sz="2000" dirty="0" smtClean="0"/>
+              <a:t>the existing work, and runs average eight times faster and uses two times less memory. </a:t>
+            </a:r>
           </a:p>
         </p:txBody>
       </p:sp>
@@ -33889,7 +33730,7 @@
   <p:timing>
     <p:tnLst>
       <p:par>
-        <p:cTn xmlns:p14="http://schemas.microsoft.com/office/powerpoint/2010/main" id="1" dur="indefinite" restart="never" nodeType="tmRoot"/>
+        <p:cTn id="1" dur="indefinite" restart="never" nodeType="tmRoot"/>
       </p:par>
     </p:tnLst>
   </p:timing>
@@ -33968,7 +33809,7 @@
   <p:timing>
     <p:tnLst>
       <p:par>
-        <p:cTn xmlns:p14="http://schemas.microsoft.com/office/powerpoint/2010/main" id="1" dur="indefinite" restart="never" nodeType="tmRoot"/>
+        <p:cTn id="1" dur="indefinite" restart="never" nodeType="tmRoot"/>
       </p:par>
     </p:tnLst>
   </p:timing>
@@ -35285,7 +35126,7 @@
   <p:timing>
     <p:tnLst>
       <p:par>
-        <p:cTn xmlns:p14="http://schemas.microsoft.com/office/powerpoint/2010/main" id="1" dur="indefinite" restart="never" nodeType="tmRoot"/>
+        <p:cTn id="1" dur="indefinite" restart="never" nodeType="tmRoot"/>
       </p:par>
     </p:tnLst>
   </p:timing>
@@ -35476,7 +35317,7 @@
   <p:timing>
     <p:tnLst>
       <p:par>
-        <p:cTn xmlns:p14="http://schemas.microsoft.com/office/powerpoint/2010/main" id="1" dur="indefinite" restart="never" nodeType="tmRoot"/>
+        <p:cTn id="1" dur="indefinite" restart="never" nodeType="tmRoot"/>
       </p:par>
     </p:tnLst>
   </p:timing>
@@ -37143,7 +36984,7 @@
   <p:timing>
     <p:tnLst>
       <p:par>
-        <p:cTn xmlns:p14="http://schemas.microsoft.com/office/powerpoint/2010/main" id="1" dur="indefinite" restart="never" nodeType="tmRoot"/>
+        <p:cTn id="1" dur="indefinite" restart="never" nodeType="tmRoot"/>
       </p:par>
     </p:tnLst>
   </p:timing>
@@ -37225,8 +37066,8 @@
           <a:p>
             <a:pPr algn="ctr"/>
             <a:r>
-              <a:rPr lang="en-US" i="1" dirty="0" err="1" smtClean="0"/>
-              <a:t>defs</a:t>
+              <a:rPr lang="en-US" i="1" dirty="0" smtClean="0"/>
+              <a:t>definitions</a:t>
             </a:r>
             <a:endParaRPr lang="en-US" i="1" dirty="0"/>
           </a:p>
@@ -37329,7 +37170,7 @@
   <p:timing>
     <p:tnLst>
       <p:par>
-        <p:cTn xmlns:p14="http://schemas.microsoft.com/office/powerpoint/2010/main" id="1" dur="indefinite" restart="never" nodeType="tmRoot"/>
+        <p:cTn id="1" dur="indefinite" restart="never" nodeType="tmRoot"/>
       </p:par>
     </p:tnLst>
   </p:timing>
@@ -37415,8 +37256,8 @@
           <a:p>
             <a:pPr algn="ctr"/>
             <a:r>
-              <a:rPr lang="en-US" i="1" dirty="0" err="1" smtClean="0"/>
-              <a:t>defs</a:t>
+              <a:rPr lang="en-US" i="1" dirty="0" smtClean="0"/>
+              <a:t>definitions</a:t>
             </a:r>
             <a:endParaRPr lang="en-US" i="1" dirty="0"/>
           </a:p>
@@ -37573,23 +37414,7 @@
           <a:p>
             <a:r>
               <a:rPr lang="en-US" dirty="0" smtClean="0"/>
-              <a:t>All </a:t>
-            </a:r>
-            <a:r>
-              <a:rPr lang="en-US" dirty="0" smtClean="0"/>
-              <a:t>declarations </a:t>
-            </a:r>
-            <a:r>
-              <a:rPr lang="en-US" dirty="0" smtClean="0"/>
-              <a:t>of the </a:t>
-            </a:r>
-            <a:r>
-              <a:rPr lang="en-US" dirty="0" smtClean="0"/>
-              <a:t>send, receive operations and </a:t>
-            </a:r>
-            <a:r>
-              <a:rPr lang="en-US" dirty="0" smtClean="0"/>
-              <a:t>the free variables </a:t>
+              <a:t>All declarations of the send, receive operations and the free variables </a:t>
             </a:r>
             <a:endParaRPr lang="en-US" dirty="0"/>
           </a:p>
@@ -37608,7 +37433,7 @@
   <p:timing>
     <p:tnLst>
       <p:par>
-        <p:cTn xmlns:p14="http://schemas.microsoft.com/office/powerpoint/2010/main" id="1" dur="indefinite" restart="never" nodeType="tmRoot"/>
+        <p:cTn id="1" dur="indefinite" restart="never" nodeType="tmRoot"/>
       </p:par>
     </p:tnLst>
   </p:timing>
@@ -37694,8 +37519,8 @@
           <a:p>
             <a:pPr algn="ctr"/>
             <a:r>
-              <a:rPr lang="en-US" i="1" dirty="0" err="1" smtClean="0"/>
-              <a:t>defs</a:t>
+              <a:rPr lang="en-US" i="1" dirty="0" smtClean="0"/>
+              <a:t>definitions</a:t>
             </a:r>
             <a:endParaRPr lang="en-US" i="1" dirty="0"/>
           </a:p>
@@ -37852,15 +37677,7 @@
           <a:p>
             <a:r>
               <a:rPr lang="en-US" dirty="0" smtClean="0"/>
-              <a:t>All </a:t>
-            </a:r>
-            <a:r>
-              <a:rPr lang="en-US" dirty="0" smtClean="0"/>
-              <a:t>declarations </a:t>
-            </a:r>
-            <a:r>
-              <a:rPr lang="en-US" dirty="0" smtClean="0"/>
-              <a:t>of the send, receive operations and the free variables </a:t>
+              <a:t>All declarations of the send, receive operations and the free variables </a:t>
             </a:r>
             <a:endParaRPr lang="en-US" dirty="0"/>
           </a:p>
@@ -37952,7 +37769,7 @@
   <p:timing>
     <p:tnLst>
       <p:par>
-        <p:cTn xmlns:p14="http://schemas.microsoft.com/office/powerpoint/2010/main" id="1" dur="indefinite" restart="never" nodeType="tmRoot"/>
+        <p:cTn id="1" dur="indefinite" restart="never" nodeType="tmRoot"/>
       </p:par>
     </p:tnLst>
   </p:timing>

</xml_diff>